<commit_message>
SUMQ, INS, and Test Doc
The above forms are up on our repo. Can be found under
/Artifacts/Cycle2

Signed-off-by: Brian Powell <powellb1@my.erau.edu>
</commit_message>
<xml_diff>
--- a/Artifacts/Cycle 2/Presentation.pptx
+++ b/Artifacts/Cycle 2/Presentation.pptx
@@ -2,7 +2,7 @@
 <file path=ppt/presentation.xml><?xml version="1.0" encoding="utf-8"?>
 <p:presentation xmlns:a="http://schemas.openxmlformats.org/drawingml/2006/main" xmlns:r="http://schemas.openxmlformats.org/officeDocument/2006/relationships" xmlns:p="http://schemas.openxmlformats.org/presentationml/2006/main" saveSubsetFonts="1">
   <p:sldMasterIdLst>
-    <p:sldMasterId id="2147483648" r:id="rId1"/>
+    <p:sldMasterId id="2147483660" r:id="rId1"/>
   </p:sldMasterIdLst>
   <p:sldIdLst>
     <p:sldId id="256" r:id="rId2"/>
@@ -135,7 +135,7 @@
       </p:grpSpPr>
       <p:sp>
         <p:nvSpPr>
-          <p:cNvPr id="2" name="Title 1"/>
+          <p:cNvPr id="8" name="Title 7"/>
           <p:cNvSpPr>
             <a:spLocks noGrp="1"/>
           </p:cNvSpPr>
@@ -145,29 +145,139 @@
         </p:nvSpPr>
         <p:spPr>
           <a:xfrm>
-            <a:off x="1524000" y="1122363"/>
-            <a:ext cx="9144000" cy="2387600"/>
+            <a:off x="562707" y="1371600"/>
+            <a:ext cx="10972800" cy="1828800"/>
           </a:xfrm>
         </p:spPr>
         <p:txBody>
-          <a:bodyPr anchor="b"/>
+          <a:bodyPr vert="horz" lIns="45720" tIns="0" rIns="45720" bIns="0" anchor="b">
+            <a:normAutofit/>
+            <a:scene3d>
+              <a:camera prst="orthographicFront"/>
+              <a:lightRig rig="soft" dir="t">
+                <a:rot lat="0" lon="0" rev="17220000"/>
+              </a:lightRig>
+            </a:scene3d>
+            <a:sp3d prstMaterial="softEdge">
+              <a:bevelT w="38100" h="38100"/>
+            </a:sp3d>
+          </a:bodyPr>
           <a:lstStyle>
-            <a:lvl1pPr algn="ctr">
-              <a:defRPr sz="6000"/>
+            <a:lvl1pPr>
+              <a:defRPr sz="4800" b="1" cap="all" baseline="0">
+                <a:ln w="6350">
+                  <a:noFill/>
+                </a:ln>
+                <a:gradFill>
+                  <a:gsLst>
+                    <a:gs pos="0">
+                      <a:schemeClr val="accent1">
+                        <a:tint val="73000"/>
+                        <a:satMod val="145000"/>
+                      </a:schemeClr>
+                    </a:gs>
+                    <a:gs pos="73000">
+                      <a:schemeClr val="accent1">
+                        <a:tint val="73000"/>
+                        <a:satMod val="145000"/>
+                      </a:schemeClr>
+                    </a:gs>
+                    <a:gs pos="100000">
+                      <a:schemeClr val="accent1">
+                        <a:tint val="83000"/>
+                        <a:satMod val="143000"/>
+                      </a:schemeClr>
+                    </a:gs>
+                  </a:gsLst>
+                  <a:lin ang="4800000" scaled="1"/>
+                </a:gradFill>
+                <a:effectLst>
+                  <a:outerShdw blurRad="127000" dist="200000" dir="2700000" algn="tl" rotWithShape="0">
+                    <a:srgbClr val="000000">
+                      <a:alpha val="30000"/>
+                    </a:srgbClr>
+                  </a:outerShdw>
+                </a:effectLst>
+              </a:defRPr>
             </a:lvl1pPr>
           </a:lstStyle>
           <a:p>
             <a:r>
-              <a:rPr lang="en-US" smtClean="0"/>
+              <a:rPr kumimoji="0" lang="en-US" smtClean="0"/>
               <a:t>Click to edit Master title style</a:t>
             </a:r>
+            <a:endParaRPr kumimoji="0" lang="en-US"/>
+          </a:p>
+        </p:txBody>
+      </p:sp>
+      <p:sp>
+        <p:nvSpPr>
+          <p:cNvPr id="28" name="Date Placeholder 27"/>
+          <p:cNvSpPr>
+            <a:spLocks noGrp="1"/>
+          </p:cNvSpPr>
+          <p:nvPr>
+            <p:ph type="dt" sz="half" idx="10"/>
+          </p:nvPr>
+        </p:nvSpPr>
+        <p:spPr/>
+        <p:txBody>
+          <a:bodyPr/>
+          <a:lstStyle/>
+          <a:p>
+            <a:fld id="{64F4A515-AF31-469B-9337-896FE1DBE917}" type="datetimeFigureOut">
+              <a:rPr lang="en-US" smtClean="0"/>
+              <a:t>4/21/2013</a:t>
+            </a:fld>
             <a:endParaRPr lang="en-US"/>
           </a:p>
         </p:txBody>
       </p:sp>
       <p:sp>
         <p:nvSpPr>
-          <p:cNvPr id="3" name="Subtitle 2"/>
+          <p:cNvPr id="17" name="Footer Placeholder 16"/>
+          <p:cNvSpPr>
+            <a:spLocks noGrp="1"/>
+          </p:cNvSpPr>
+          <p:nvPr>
+            <p:ph type="ftr" sz="quarter" idx="11"/>
+          </p:nvPr>
+        </p:nvSpPr>
+        <p:spPr/>
+        <p:txBody>
+          <a:bodyPr/>
+          <a:lstStyle/>
+          <a:p>
+            <a:endParaRPr lang="en-US"/>
+          </a:p>
+        </p:txBody>
+      </p:sp>
+      <p:sp>
+        <p:nvSpPr>
+          <p:cNvPr id="29" name="Slide Number Placeholder 28"/>
+          <p:cNvSpPr>
+            <a:spLocks noGrp="1"/>
+          </p:cNvSpPr>
+          <p:nvPr>
+            <p:ph type="sldNum" sz="quarter" idx="12"/>
+          </p:nvPr>
+        </p:nvSpPr>
+        <p:spPr/>
+        <p:txBody>
+          <a:bodyPr/>
+          <a:lstStyle/>
+          <a:p>
+            <a:fld id="{078B2F64-CEF6-4530-BD53-6A2339097C0F}" type="slidenum">
+              <a:rPr lang="en-US" smtClean="0"/>
+              <a:t>‹#›</a:t>
+            </a:fld>
+            <a:endParaRPr lang="en-US"/>
+          </a:p>
+        </p:txBody>
+      </p:sp>
+      <p:sp>
+        <p:nvSpPr>
+          <p:cNvPr id="9" name="Subtitle 8"/>
           <p:cNvSpPr>
             <a:spLocks noGrp="1"/>
           </p:cNvSpPr>
@@ -177,8 +287,8 @@
         </p:nvSpPr>
         <p:spPr>
           <a:xfrm>
-            <a:off x="1524000" y="3602038"/>
-            <a:ext cx="9144000" cy="1655762"/>
+            <a:off x="1828800" y="3331698"/>
+            <a:ext cx="8534400" cy="1752600"/>
           </a:xfrm>
         </p:spPr>
         <p:txBody>
@@ -186,121 +296,47 @@
           <a:lstStyle>
             <a:lvl1pPr marL="0" indent="0" algn="ctr">
               <a:buNone/>
-              <a:defRPr sz="2400"/>
+              <a:defRPr>
+                <a:solidFill>
+                  <a:schemeClr val="tx1"/>
+                </a:solidFill>
+              </a:defRPr>
             </a:lvl1pPr>
             <a:lvl2pPr marL="457200" indent="0" algn="ctr">
               <a:buNone/>
-              <a:defRPr sz="2000"/>
             </a:lvl2pPr>
             <a:lvl3pPr marL="914400" indent="0" algn="ctr">
               <a:buNone/>
-              <a:defRPr sz="1800"/>
             </a:lvl3pPr>
             <a:lvl4pPr marL="1371600" indent="0" algn="ctr">
               <a:buNone/>
-              <a:defRPr sz="1600"/>
             </a:lvl4pPr>
             <a:lvl5pPr marL="1828800" indent="0" algn="ctr">
               <a:buNone/>
-              <a:defRPr sz="1600"/>
             </a:lvl5pPr>
             <a:lvl6pPr marL="2286000" indent="0" algn="ctr">
               <a:buNone/>
-              <a:defRPr sz="1600"/>
             </a:lvl6pPr>
             <a:lvl7pPr marL="2743200" indent="0" algn="ctr">
               <a:buNone/>
-              <a:defRPr sz="1600"/>
             </a:lvl7pPr>
             <a:lvl8pPr marL="3200400" indent="0" algn="ctr">
               <a:buNone/>
-              <a:defRPr sz="1600"/>
             </a:lvl8pPr>
             <a:lvl9pPr marL="3657600" indent="0" algn="ctr">
               <a:buNone/>
-              <a:defRPr sz="1600"/>
             </a:lvl9pPr>
           </a:lstStyle>
           <a:p>
             <a:r>
-              <a:rPr lang="en-US" smtClean="0"/>
+              <a:rPr kumimoji="0" lang="en-US" smtClean="0"/>
               <a:t>Click to edit Master subtitle style</a:t>
             </a:r>
-            <a:endParaRPr lang="en-US"/>
-          </a:p>
-        </p:txBody>
-      </p:sp>
-      <p:sp>
-        <p:nvSpPr>
-          <p:cNvPr id="4" name="Date Placeholder 3"/>
-          <p:cNvSpPr>
-            <a:spLocks noGrp="1"/>
-          </p:cNvSpPr>
-          <p:nvPr>
-            <p:ph type="dt" sz="half" idx="10"/>
-          </p:nvPr>
-        </p:nvSpPr>
-        <p:spPr/>
-        <p:txBody>
-          <a:bodyPr/>
-          <a:lstStyle/>
-          <a:p>
-            <a:fld id="{64F4A515-AF31-469B-9337-896FE1DBE917}" type="datetimeFigureOut">
-              <a:rPr lang="en-US" smtClean="0"/>
-              <a:t>4/20/2013</a:t>
-            </a:fld>
-            <a:endParaRPr lang="en-US"/>
-          </a:p>
-        </p:txBody>
-      </p:sp>
-      <p:sp>
-        <p:nvSpPr>
-          <p:cNvPr id="5" name="Footer Placeholder 4"/>
-          <p:cNvSpPr>
-            <a:spLocks noGrp="1"/>
-          </p:cNvSpPr>
-          <p:nvPr>
-            <p:ph type="ftr" sz="quarter" idx="11"/>
-          </p:nvPr>
-        </p:nvSpPr>
-        <p:spPr/>
-        <p:txBody>
-          <a:bodyPr/>
-          <a:lstStyle/>
-          <a:p>
-            <a:endParaRPr lang="en-US"/>
-          </a:p>
-        </p:txBody>
-      </p:sp>
-      <p:sp>
-        <p:nvSpPr>
-          <p:cNvPr id="6" name="Slide Number Placeholder 5"/>
-          <p:cNvSpPr>
-            <a:spLocks noGrp="1"/>
-          </p:cNvSpPr>
-          <p:nvPr>
-            <p:ph type="sldNum" sz="quarter" idx="12"/>
-          </p:nvPr>
-        </p:nvSpPr>
-        <p:spPr/>
-        <p:txBody>
-          <a:bodyPr/>
-          <a:lstStyle/>
-          <a:p>
-            <a:fld id="{078B2F64-CEF6-4530-BD53-6A2339097C0F}" type="slidenum">
-              <a:rPr lang="en-US" smtClean="0"/>
-              <a:t>‹#›</a:t>
-            </a:fld>
-            <a:endParaRPr lang="en-US"/>
+            <a:endParaRPr kumimoji="0" lang="en-US"/>
           </a:p>
         </p:txBody>
       </p:sp>
     </p:spTree>
-    <p:extLst>
-      <p:ext uri="{BB962C8B-B14F-4D97-AF65-F5344CB8AC3E}">
-        <p14:creationId xmlns:p14="http://schemas.microsoft.com/office/powerpoint/2010/main" val="1845550431"/>
-      </p:ext>
-    </p:extLst>
   </p:cSld>
   <p:clrMapOvr>
     <a:masterClrMapping/>
@@ -341,10 +377,10 @@
           <a:lstStyle/>
           <a:p>
             <a:r>
-              <a:rPr lang="en-US" smtClean="0"/>
+              <a:rPr kumimoji="0" lang="en-US" smtClean="0"/>
               <a:t>Click to edit Master title style</a:t>
             </a:r>
-            <a:endParaRPr lang="en-US"/>
+            <a:endParaRPr kumimoji="0" lang="en-US"/>
           </a:p>
         </p:txBody>
       </p:sp>
@@ -363,40 +399,40 @@
           <a:bodyPr vert="eaVert"/>
           <a:lstStyle/>
           <a:p>
-            <a:pPr lvl="0"/>
+            <a:pPr lvl="0" eaLnBrk="1" latinLnBrk="0" hangingPunct="1"/>
             <a:r>
               <a:rPr lang="en-US" smtClean="0"/>
               <a:t>Click to edit Master text styles</a:t>
             </a:r>
           </a:p>
           <a:p>
-            <a:pPr lvl="1"/>
+            <a:pPr lvl="1" eaLnBrk="1" latinLnBrk="0" hangingPunct="1"/>
             <a:r>
               <a:rPr lang="en-US" smtClean="0"/>
               <a:t>Second level</a:t>
             </a:r>
           </a:p>
           <a:p>
-            <a:pPr lvl="2"/>
+            <a:pPr lvl="2" eaLnBrk="1" latinLnBrk="0" hangingPunct="1"/>
             <a:r>
               <a:rPr lang="en-US" smtClean="0"/>
               <a:t>Third level</a:t>
             </a:r>
           </a:p>
           <a:p>
-            <a:pPr lvl="3"/>
+            <a:pPr lvl="3" eaLnBrk="1" latinLnBrk="0" hangingPunct="1"/>
             <a:r>
               <a:rPr lang="en-US" smtClean="0"/>
               <a:t>Fourth level</a:t>
             </a:r>
           </a:p>
           <a:p>
-            <a:pPr lvl="4"/>
+            <a:pPr lvl="4" eaLnBrk="1" latinLnBrk="0" hangingPunct="1"/>
             <a:r>
               <a:rPr lang="en-US" smtClean="0"/>
               <a:t>Fifth level</a:t>
             </a:r>
-            <a:endParaRPr lang="en-US"/>
+            <a:endParaRPr kumimoji="0" lang="en-US"/>
           </a:p>
         </p:txBody>
       </p:sp>
@@ -417,7 +453,7 @@
           <a:p>
             <a:fld id="{64F4A515-AF31-469B-9337-896FE1DBE917}" type="datetimeFigureOut">
               <a:rPr lang="en-US" smtClean="0"/>
-              <a:t>4/20/2013</a:t>
+              <a:t>4/21/2013</a:t>
             </a:fld>
             <a:endParaRPr lang="en-US"/>
           </a:p>
@@ -466,11 +502,6 @@
         </p:txBody>
       </p:sp>
     </p:spTree>
-    <p:extLst>
-      <p:ext uri="{BB962C8B-B14F-4D97-AF65-F5344CB8AC3E}">
-        <p14:creationId xmlns:p14="http://schemas.microsoft.com/office/powerpoint/2010/main" val="3036632181"/>
-      </p:ext>
-    </p:extLst>
   </p:cSld>
   <p:clrMapOvr>
     <a:masterClrMapping/>
@@ -507,8 +538,8 @@
         </p:nvSpPr>
         <p:spPr>
           <a:xfrm>
-            <a:off x="8724900" y="365125"/>
-            <a:ext cx="2628900" cy="5811838"/>
+            <a:off x="8839200" y="274639"/>
+            <a:ext cx="2743200" cy="5851525"/>
           </a:xfrm>
         </p:spPr>
         <p:txBody>
@@ -516,10 +547,10 @@
           <a:lstStyle/>
           <a:p>
             <a:r>
-              <a:rPr lang="en-US" smtClean="0"/>
+              <a:rPr kumimoji="0" lang="en-US" smtClean="0"/>
               <a:t>Click to edit Master title style</a:t>
             </a:r>
-            <a:endParaRPr lang="en-US"/>
+            <a:endParaRPr kumimoji="0" lang="en-US"/>
           </a:p>
         </p:txBody>
       </p:sp>
@@ -535,48 +566,48 @@
         </p:nvSpPr>
         <p:spPr>
           <a:xfrm>
-            <a:off x="838200" y="365125"/>
-            <a:ext cx="7734300" cy="5811838"/>
+            <a:off x="609600" y="274639"/>
+            <a:ext cx="8026400" cy="5851525"/>
           </a:xfrm>
         </p:spPr>
         <p:txBody>
           <a:bodyPr vert="eaVert"/>
           <a:lstStyle/>
           <a:p>
-            <a:pPr lvl="0"/>
+            <a:pPr lvl="0" eaLnBrk="1" latinLnBrk="0" hangingPunct="1"/>
             <a:r>
               <a:rPr lang="en-US" smtClean="0"/>
               <a:t>Click to edit Master text styles</a:t>
             </a:r>
           </a:p>
           <a:p>
-            <a:pPr lvl="1"/>
+            <a:pPr lvl="1" eaLnBrk="1" latinLnBrk="0" hangingPunct="1"/>
             <a:r>
               <a:rPr lang="en-US" smtClean="0"/>
               <a:t>Second level</a:t>
             </a:r>
           </a:p>
           <a:p>
-            <a:pPr lvl="2"/>
+            <a:pPr lvl="2" eaLnBrk="1" latinLnBrk="0" hangingPunct="1"/>
             <a:r>
               <a:rPr lang="en-US" smtClean="0"/>
               <a:t>Third level</a:t>
             </a:r>
           </a:p>
           <a:p>
-            <a:pPr lvl="3"/>
+            <a:pPr lvl="3" eaLnBrk="1" latinLnBrk="0" hangingPunct="1"/>
             <a:r>
               <a:rPr lang="en-US" smtClean="0"/>
               <a:t>Fourth level</a:t>
             </a:r>
           </a:p>
           <a:p>
-            <a:pPr lvl="4"/>
+            <a:pPr lvl="4" eaLnBrk="1" latinLnBrk="0" hangingPunct="1"/>
             <a:r>
               <a:rPr lang="en-US" smtClean="0"/>
               <a:t>Fifth level</a:t>
             </a:r>
-            <a:endParaRPr lang="en-US"/>
+            <a:endParaRPr kumimoji="0" lang="en-US"/>
           </a:p>
         </p:txBody>
       </p:sp>
@@ -597,7 +628,7 @@
           <a:p>
             <a:fld id="{64F4A515-AF31-469B-9337-896FE1DBE917}" type="datetimeFigureOut">
               <a:rPr lang="en-US" smtClean="0"/>
-              <a:t>4/20/2013</a:t>
+              <a:t>4/21/2013</a:t>
             </a:fld>
             <a:endParaRPr lang="en-US"/>
           </a:p>
@@ -646,11 +677,6 @@
         </p:txBody>
       </p:sp>
     </p:spTree>
-    <p:extLst>
-      <p:ext uri="{BB962C8B-B14F-4D97-AF65-F5344CB8AC3E}">
-        <p14:creationId xmlns:p14="http://schemas.microsoft.com/office/powerpoint/2010/main" val="643883625"/>
-      </p:ext>
-    </p:extLst>
   </p:cSld>
   <p:clrMapOvr>
     <a:masterClrMapping/>
@@ -691,10 +717,10 @@
           <a:lstStyle/>
           <a:p>
             <a:r>
-              <a:rPr lang="en-US" smtClean="0"/>
+              <a:rPr kumimoji="0" lang="en-US" smtClean="0"/>
               <a:t>Click to edit Master title style</a:t>
             </a:r>
-            <a:endParaRPr lang="en-US"/>
+            <a:endParaRPr kumimoji="0" lang="en-US"/>
           </a:p>
         </p:txBody>
       </p:sp>
@@ -713,40 +739,40 @@
           <a:bodyPr/>
           <a:lstStyle/>
           <a:p>
-            <a:pPr lvl="0"/>
+            <a:pPr lvl="0" eaLnBrk="1" latinLnBrk="0" hangingPunct="1"/>
             <a:r>
               <a:rPr lang="en-US" smtClean="0"/>
               <a:t>Click to edit Master text styles</a:t>
             </a:r>
           </a:p>
           <a:p>
-            <a:pPr lvl="1"/>
+            <a:pPr lvl="1" eaLnBrk="1" latinLnBrk="0" hangingPunct="1"/>
             <a:r>
               <a:rPr lang="en-US" smtClean="0"/>
               <a:t>Second level</a:t>
             </a:r>
           </a:p>
           <a:p>
-            <a:pPr lvl="2"/>
+            <a:pPr lvl="2" eaLnBrk="1" latinLnBrk="0" hangingPunct="1"/>
             <a:r>
               <a:rPr lang="en-US" smtClean="0"/>
               <a:t>Third level</a:t>
             </a:r>
           </a:p>
           <a:p>
-            <a:pPr lvl="3"/>
+            <a:pPr lvl="3" eaLnBrk="1" latinLnBrk="0" hangingPunct="1"/>
             <a:r>
               <a:rPr lang="en-US" smtClean="0"/>
               <a:t>Fourth level</a:t>
             </a:r>
           </a:p>
           <a:p>
-            <a:pPr lvl="4"/>
+            <a:pPr lvl="4" eaLnBrk="1" latinLnBrk="0" hangingPunct="1"/>
             <a:r>
               <a:rPr lang="en-US" smtClean="0"/>
               <a:t>Fifth level</a:t>
             </a:r>
-            <a:endParaRPr lang="en-US"/>
+            <a:endParaRPr kumimoji="0" lang="en-US"/>
           </a:p>
         </p:txBody>
       </p:sp>
@@ -767,7 +793,7 @@
           <a:p>
             <a:fld id="{64F4A515-AF31-469B-9337-896FE1DBE917}" type="datetimeFigureOut">
               <a:rPr lang="en-US" smtClean="0"/>
-              <a:t>4/20/2013</a:t>
+              <a:t>4/21/2013</a:t>
             </a:fld>
             <a:endParaRPr lang="en-US"/>
           </a:p>
@@ -816,11 +842,6 @@
         </p:txBody>
       </p:sp>
     </p:spTree>
-    <p:extLst>
-      <p:ext uri="{BB962C8B-B14F-4D97-AF65-F5344CB8AC3E}">
-        <p14:creationId xmlns:p14="http://schemas.microsoft.com/office/powerpoint/2010/main" val="2197990422"/>
-      </p:ext>
-    </p:extLst>
   </p:cSld>
   <p:clrMapOvr>
     <a:masterClrMapping/>
@@ -831,6 +852,11 @@
 <file path=ppt/slideLayouts/slideLayout3.xml><?xml version="1.0" encoding="utf-8"?>
 <p:sldLayout xmlns:a="http://schemas.openxmlformats.org/drawingml/2006/main" xmlns:r="http://schemas.openxmlformats.org/officeDocument/2006/relationships" xmlns:p="http://schemas.openxmlformats.org/presentationml/2006/main" type="secHead" preserve="1">
   <p:cSld name="Section Header">
+    <p:bg>
+      <p:bgRef idx="1003">
+        <a:schemeClr val="bg2"/>
+      </p:bgRef>
+    </p:bg>
     <p:spTree>
       <p:nvGrpSpPr>
         <p:cNvPr id="1" name=""/>
@@ -857,23 +883,63 @@
         </p:nvSpPr>
         <p:spPr>
           <a:xfrm>
-            <a:off x="831850" y="1709738"/>
-            <a:ext cx="10515600" cy="2852737"/>
+            <a:off x="2133600" y="609600"/>
+            <a:ext cx="9448800" cy="1828800"/>
           </a:xfrm>
         </p:spPr>
         <p:txBody>
-          <a:bodyPr anchor="b"/>
+          <a:bodyPr vert="horz" bIns="0" anchor="b">
+            <a:noAutofit/>
+            <a:scene3d>
+              <a:camera prst="orthographicFront"/>
+              <a:lightRig rig="soft" dir="t">
+                <a:rot lat="0" lon="0" rev="17220000"/>
+              </a:lightRig>
+            </a:scene3d>
+            <a:sp3d prstMaterial="softEdge">
+              <a:bevelT w="38100" h="38100"/>
+              <a:contourClr>
+                <a:schemeClr val="tx2">
+                  <a:shade val="50000"/>
+                </a:schemeClr>
+              </a:contourClr>
+            </a:sp3d>
+          </a:bodyPr>
           <a:lstStyle>
-            <a:lvl1pPr>
-              <a:defRPr sz="6000"/>
+            <a:lvl1pPr algn="l" rtl="0">
+              <a:spcBef>
+                <a:spcPct val="0"/>
+              </a:spcBef>
+              <a:buNone/>
+              <a:defRPr sz="4800" b="1" cap="none" baseline="0">
+                <a:ln w="6350">
+                  <a:noFill/>
+                </a:ln>
+                <a:solidFill>
+                  <a:schemeClr val="accent1">
+                    <a:tint val="90000"/>
+                    <a:satMod val="120000"/>
+                  </a:schemeClr>
+                </a:solidFill>
+                <a:effectLst>
+                  <a:outerShdw blurRad="114300" dist="101600" dir="2700000" algn="tl" rotWithShape="0">
+                    <a:srgbClr val="000000">
+                      <a:alpha val="40000"/>
+                    </a:srgbClr>
+                  </a:outerShdw>
+                </a:effectLst>
+                <a:latin typeface="+mj-lt"/>
+                <a:ea typeface="+mj-ea"/>
+                <a:cs typeface="+mj-cs"/>
+              </a:defRPr>
             </a:lvl1pPr>
           </a:lstStyle>
           <a:p>
             <a:r>
-              <a:rPr lang="en-US" smtClean="0"/>
+              <a:rPr kumimoji="0" lang="en-US" smtClean="0"/>
               <a:t>Click to edit Master title style</a:t>
             </a:r>
-            <a:endParaRPr lang="en-US"/>
+            <a:endParaRPr kumimoji="0" lang="en-US"/>
           </a:p>
         </p:txBody>
       </p:sp>
@@ -889,34 +955,22 @@
         </p:nvSpPr>
         <p:spPr>
           <a:xfrm>
-            <a:off x="831850" y="4589463"/>
-            <a:ext cx="10515600" cy="1500187"/>
+            <a:off x="2133600" y="2507786"/>
+            <a:ext cx="9448800" cy="1509712"/>
           </a:xfrm>
         </p:spPr>
         <p:txBody>
-          <a:bodyPr/>
+          <a:bodyPr anchor="t"/>
           <a:lstStyle>
-            <a:lvl1pPr marL="0" indent="0">
+            <a:lvl1pPr marL="73152" indent="0" algn="l">
               <a:buNone/>
-              <a:defRPr sz="2400">
+              <a:defRPr sz="2000">
                 <a:solidFill>
-                  <a:schemeClr val="tx1">
-                    <a:tint val="75000"/>
-                  </a:schemeClr>
+                  <a:schemeClr val="tx1"/>
                 </a:solidFill>
               </a:defRPr>
             </a:lvl1pPr>
-            <a:lvl2pPr marL="457200" indent="0">
-              <a:buNone/>
-              <a:defRPr sz="2000">
-                <a:solidFill>
-                  <a:schemeClr val="tx1">
-                    <a:tint val="75000"/>
-                  </a:schemeClr>
-                </a:solidFill>
-              </a:defRPr>
-            </a:lvl2pPr>
-            <a:lvl3pPr marL="914400" indent="0">
+            <a:lvl2pPr>
               <a:buNone/>
               <a:defRPr sz="1800">
                 <a:solidFill>
@@ -925,8 +979,8 @@
                   </a:schemeClr>
                 </a:solidFill>
               </a:defRPr>
-            </a:lvl3pPr>
-            <a:lvl4pPr marL="1371600" indent="0">
+            </a:lvl2pPr>
+            <a:lvl3pPr>
               <a:buNone/>
               <a:defRPr sz="1600">
                 <a:solidFill>
@@ -935,10 +989,20 @@
                   </a:schemeClr>
                 </a:solidFill>
               </a:defRPr>
+            </a:lvl3pPr>
+            <a:lvl4pPr>
+              <a:buNone/>
+              <a:defRPr sz="1400">
+                <a:solidFill>
+                  <a:schemeClr val="tx1">
+                    <a:tint val="75000"/>
+                  </a:schemeClr>
+                </a:solidFill>
+              </a:defRPr>
             </a:lvl4pPr>
-            <a:lvl5pPr marL="1828800" indent="0">
+            <a:lvl5pPr>
               <a:buNone/>
-              <a:defRPr sz="1600">
+              <a:defRPr sz="1400">
                 <a:solidFill>
                   <a:schemeClr val="tx1">
                     <a:tint val="75000"/>
@@ -946,51 +1010,11 @@
                 </a:solidFill>
               </a:defRPr>
             </a:lvl5pPr>
-            <a:lvl6pPr marL="2286000" indent="0">
-              <a:buNone/>
-              <a:defRPr sz="1600">
-                <a:solidFill>
-                  <a:schemeClr val="tx1">
-                    <a:tint val="75000"/>
-                  </a:schemeClr>
-                </a:solidFill>
-              </a:defRPr>
-            </a:lvl6pPr>
-            <a:lvl7pPr marL="2743200" indent="0">
-              <a:buNone/>
-              <a:defRPr sz="1600">
-                <a:solidFill>
-                  <a:schemeClr val="tx1">
-                    <a:tint val="75000"/>
-                  </a:schemeClr>
-                </a:solidFill>
-              </a:defRPr>
-            </a:lvl7pPr>
-            <a:lvl8pPr marL="3200400" indent="0">
-              <a:buNone/>
-              <a:defRPr sz="1600">
-                <a:solidFill>
-                  <a:schemeClr val="tx1">
-                    <a:tint val="75000"/>
-                  </a:schemeClr>
-                </a:solidFill>
-              </a:defRPr>
-            </a:lvl8pPr>
-            <a:lvl9pPr marL="3657600" indent="0">
-              <a:buNone/>
-              <a:defRPr sz="1600">
-                <a:solidFill>
-                  <a:schemeClr val="tx1">
-                    <a:tint val="75000"/>
-                  </a:schemeClr>
-                </a:solidFill>
-              </a:defRPr>
-            </a:lvl9pPr>
           </a:lstStyle>
           <a:p>
-            <a:pPr lvl="0"/>
-            <a:r>
-              <a:rPr lang="en-US" smtClean="0"/>
+            <a:pPr lvl="0" eaLnBrk="1" latinLnBrk="0" hangingPunct="1"/>
+            <a:r>
+              <a:rPr kumimoji="0" lang="en-US" smtClean="0"/>
               <a:t>Click to edit Master text styles</a:t>
             </a:r>
           </a:p>
@@ -1013,7 +1037,7 @@
           <a:p>
             <a:fld id="{64F4A515-AF31-469B-9337-896FE1DBE917}" type="datetimeFigureOut">
               <a:rPr lang="en-US" smtClean="0"/>
-              <a:t>4/20/2013</a:t>
+              <a:t>4/21/2013</a:t>
             </a:fld>
             <a:endParaRPr lang="en-US"/>
           </a:p>
@@ -1048,7 +1072,12 @@
             <p:ph type="sldNum" sz="quarter" idx="12"/>
           </p:nvPr>
         </p:nvSpPr>
-        <p:spPr/>
+        <p:spPr>
+          <a:xfrm>
+            <a:off x="10566400" y="6416676"/>
+            <a:ext cx="1016000" cy="365125"/>
+          </a:xfrm>
+        </p:spPr>
         <p:txBody>
           <a:bodyPr/>
           <a:lstStyle/>
@@ -1062,14 +1091,9 @@
         </p:txBody>
       </p:sp>
     </p:spTree>
-    <p:extLst>
-      <p:ext uri="{BB962C8B-B14F-4D97-AF65-F5344CB8AC3E}">
-        <p14:creationId xmlns:p14="http://schemas.microsoft.com/office/powerpoint/2010/main" val="585418516"/>
-      </p:ext>
-    </p:extLst>
   </p:cSld>
   <p:clrMapOvr>
-    <a:masterClrMapping/>
+    <a:overrideClrMapping bg1="dk1" tx1="lt1" bg2="dk2" tx2="lt2" accent1="accent1" accent2="accent2" accent3="accent3" accent4="accent4" accent5="accent5" accent6="accent6" hlink="hlink" folHlink="folHlink"/>
   </p:clrMapOvr>
 </p:sldLayout>
 </file>
@@ -1107,10 +1131,10 @@
           <a:lstStyle/>
           <a:p>
             <a:r>
-              <a:rPr lang="en-US" smtClean="0"/>
+              <a:rPr kumimoji="0" lang="en-US" smtClean="0"/>
               <a:t>Click to edit Master title style</a:t>
             </a:r>
-            <a:endParaRPr lang="en-US"/>
+            <a:endParaRPr kumimoji="0" lang="en-US"/>
           </a:p>
         </p:txBody>
       </p:sp>
@@ -1126,48 +1150,64 @@
         </p:nvSpPr>
         <p:spPr>
           <a:xfrm>
-            <a:off x="838200" y="1825625"/>
-            <a:ext cx="5181600" cy="4351338"/>
+            <a:off x="609600" y="1600201"/>
+            <a:ext cx="5384800" cy="4525963"/>
           </a:xfrm>
         </p:spPr>
         <p:txBody>
           <a:bodyPr/>
-          <a:lstStyle/>
-          <a:p>
-            <a:pPr lvl="0"/>
+          <a:lstStyle>
+            <a:lvl1pPr>
+              <a:defRPr sz="2600"/>
+            </a:lvl1pPr>
+            <a:lvl2pPr>
+              <a:defRPr sz="2400"/>
+            </a:lvl2pPr>
+            <a:lvl3pPr>
+              <a:defRPr sz="2000"/>
+            </a:lvl3pPr>
+            <a:lvl4pPr>
+              <a:defRPr sz="1800"/>
+            </a:lvl4pPr>
+            <a:lvl5pPr>
+              <a:defRPr sz="1800"/>
+            </a:lvl5pPr>
+          </a:lstStyle>
+          <a:p>
+            <a:pPr lvl="0" eaLnBrk="1" latinLnBrk="0" hangingPunct="1"/>
             <a:r>
               <a:rPr lang="en-US" smtClean="0"/>
               <a:t>Click to edit Master text styles</a:t>
             </a:r>
           </a:p>
           <a:p>
-            <a:pPr lvl="1"/>
+            <a:pPr lvl="1" eaLnBrk="1" latinLnBrk="0" hangingPunct="1"/>
             <a:r>
               <a:rPr lang="en-US" smtClean="0"/>
               <a:t>Second level</a:t>
             </a:r>
           </a:p>
           <a:p>
-            <a:pPr lvl="2"/>
+            <a:pPr lvl="2" eaLnBrk="1" latinLnBrk="0" hangingPunct="1"/>
             <a:r>
               <a:rPr lang="en-US" smtClean="0"/>
               <a:t>Third level</a:t>
             </a:r>
           </a:p>
           <a:p>
-            <a:pPr lvl="3"/>
+            <a:pPr lvl="3" eaLnBrk="1" latinLnBrk="0" hangingPunct="1"/>
             <a:r>
               <a:rPr lang="en-US" smtClean="0"/>
               <a:t>Fourth level</a:t>
             </a:r>
           </a:p>
           <a:p>
-            <a:pPr lvl="4"/>
+            <a:pPr lvl="4" eaLnBrk="1" latinLnBrk="0" hangingPunct="1"/>
             <a:r>
               <a:rPr lang="en-US" smtClean="0"/>
               <a:t>Fifth level</a:t>
             </a:r>
-            <a:endParaRPr lang="en-US"/>
+            <a:endParaRPr kumimoji="0" lang="en-US"/>
           </a:p>
         </p:txBody>
       </p:sp>
@@ -1183,48 +1223,64 @@
         </p:nvSpPr>
         <p:spPr>
           <a:xfrm>
-            <a:off x="6172200" y="1825625"/>
-            <a:ext cx="5181600" cy="4351338"/>
+            <a:off x="6197600" y="1600201"/>
+            <a:ext cx="5384800" cy="4525963"/>
           </a:xfrm>
         </p:spPr>
         <p:txBody>
           <a:bodyPr/>
-          <a:lstStyle/>
-          <a:p>
-            <a:pPr lvl="0"/>
+          <a:lstStyle>
+            <a:lvl1pPr>
+              <a:defRPr sz="2600"/>
+            </a:lvl1pPr>
+            <a:lvl2pPr>
+              <a:defRPr sz="2400"/>
+            </a:lvl2pPr>
+            <a:lvl3pPr>
+              <a:defRPr sz="2000"/>
+            </a:lvl3pPr>
+            <a:lvl4pPr>
+              <a:defRPr sz="1800"/>
+            </a:lvl4pPr>
+            <a:lvl5pPr>
+              <a:defRPr sz="1800"/>
+            </a:lvl5pPr>
+          </a:lstStyle>
+          <a:p>
+            <a:pPr lvl="0" eaLnBrk="1" latinLnBrk="0" hangingPunct="1"/>
             <a:r>
               <a:rPr lang="en-US" smtClean="0"/>
               <a:t>Click to edit Master text styles</a:t>
             </a:r>
           </a:p>
           <a:p>
-            <a:pPr lvl="1"/>
+            <a:pPr lvl="1" eaLnBrk="1" latinLnBrk="0" hangingPunct="1"/>
             <a:r>
               <a:rPr lang="en-US" smtClean="0"/>
               <a:t>Second level</a:t>
             </a:r>
           </a:p>
           <a:p>
-            <a:pPr lvl="2"/>
+            <a:pPr lvl="2" eaLnBrk="1" latinLnBrk="0" hangingPunct="1"/>
             <a:r>
               <a:rPr lang="en-US" smtClean="0"/>
               <a:t>Third level</a:t>
             </a:r>
           </a:p>
           <a:p>
-            <a:pPr lvl="3"/>
+            <a:pPr lvl="3" eaLnBrk="1" latinLnBrk="0" hangingPunct="1"/>
             <a:r>
               <a:rPr lang="en-US" smtClean="0"/>
               <a:t>Fourth level</a:t>
             </a:r>
           </a:p>
           <a:p>
-            <a:pPr lvl="4"/>
+            <a:pPr lvl="4" eaLnBrk="1" latinLnBrk="0" hangingPunct="1"/>
             <a:r>
               <a:rPr lang="en-US" smtClean="0"/>
               <a:t>Fifth level</a:t>
             </a:r>
-            <a:endParaRPr lang="en-US"/>
+            <a:endParaRPr kumimoji="0" lang="en-US"/>
           </a:p>
         </p:txBody>
       </p:sp>
@@ -1245,7 +1301,7 @@
           <a:p>
             <a:fld id="{64F4A515-AF31-469B-9337-896FE1DBE917}" type="datetimeFigureOut">
               <a:rPr lang="en-US" smtClean="0"/>
-              <a:t>4/20/2013</a:t>
+              <a:t>4/21/2013</a:t>
             </a:fld>
             <a:endParaRPr lang="en-US"/>
           </a:p>
@@ -1294,11 +1350,6 @@
         </p:txBody>
       </p:sp>
     </p:spTree>
-    <p:extLst>
-      <p:ext uri="{BB962C8B-B14F-4D97-AF65-F5344CB8AC3E}">
-        <p14:creationId xmlns:p14="http://schemas.microsoft.com/office/powerpoint/2010/main" val="3407955361"/>
-      </p:ext>
-    </p:extLst>
   </p:cSld>
   <p:clrMapOvr>
     <a:masterClrMapping/>
@@ -1335,19 +1386,23 @@
         </p:nvSpPr>
         <p:spPr>
           <a:xfrm>
-            <a:off x="839788" y="365125"/>
-            <a:ext cx="10515600" cy="1325563"/>
+            <a:off x="609600" y="273050"/>
+            <a:ext cx="10972800" cy="1143000"/>
           </a:xfrm>
         </p:spPr>
         <p:txBody>
-          <a:bodyPr/>
-          <a:lstStyle/>
-          <a:p>
-            <a:r>
-              <a:rPr lang="en-US" smtClean="0"/>
+          <a:bodyPr anchor="ctr"/>
+          <a:lstStyle>
+            <a:lvl1pPr>
+              <a:defRPr/>
+            </a:lvl1pPr>
+          </a:lstStyle>
+          <a:p>
+            <a:r>
+              <a:rPr kumimoji="0" lang="en-US" smtClean="0"/>
               <a:t>Click to edit Master title style</a:t>
             </a:r>
-            <a:endParaRPr lang="en-US"/>
+            <a:endParaRPr kumimoji="0" lang="en-US"/>
           </a:p>
         </p:txBody>
       </p:sp>
@@ -1363,54 +1418,42 @@
         </p:nvSpPr>
         <p:spPr>
           <a:xfrm>
-            <a:off x="839788" y="1681163"/>
-            <a:ext cx="5157787" cy="823912"/>
+            <a:off x="609600" y="1535113"/>
+            <a:ext cx="5386917" cy="750887"/>
           </a:xfrm>
         </p:spPr>
         <p:txBody>
-          <a:bodyPr anchor="b"/>
+          <a:bodyPr anchor="ctr"/>
           <a:lstStyle>
             <a:lvl1pPr marL="0" indent="0">
               <a:buNone/>
-              <a:defRPr sz="2400" b="1"/>
+              <a:defRPr sz="2400" b="0" cap="all" baseline="0">
+                <a:solidFill>
+                  <a:schemeClr val="tx1"/>
+                </a:solidFill>
+              </a:defRPr>
             </a:lvl1pPr>
-            <a:lvl2pPr marL="457200" indent="0">
+            <a:lvl2pPr>
               <a:buNone/>
               <a:defRPr sz="2000" b="1"/>
             </a:lvl2pPr>
-            <a:lvl3pPr marL="914400" indent="0">
+            <a:lvl3pPr>
               <a:buNone/>
               <a:defRPr sz="1800" b="1"/>
             </a:lvl3pPr>
-            <a:lvl4pPr marL="1371600" indent="0">
+            <a:lvl4pPr>
               <a:buNone/>
               <a:defRPr sz="1600" b="1"/>
             </a:lvl4pPr>
-            <a:lvl5pPr marL="1828800" indent="0">
+            <a:lvl5pPr>
               <a:buNone/>
               <a:defRPr sz="1600" b="1"/>
             </a:lvl5pPr>
-            <a:lvl6pPr marL="2286000" indent="0">
-              <a:buNone/>
-              <a:defRPr sz="1600" b="1"/>
-            </a:lvl6pPr>
-            <a:lvl7pPr marL="2743200" indent="0">
-              <a:buNone/>
-              <a:defRPr sz="1600" b="1"/>
-            </a:lvl7pPr>
-            <a:lvl8pPr marL="3200400" indent="0">
-              <a:buNone/>
-              <a:defRPr sz="1600" b="1"/>
-            </a:lvl8pPr>
-            <a:lvl9pPr marL="3657600" indent="0">
-              <a:buNone/>
-              <a:defRPr sz="1600" b="1"/>
-            </a:lvl9pPr>
           </a:lstStyle>
           <a:p>
-            <a:pPr lvl="0"/>
-            <a:r>
-              <a:rPr lang="en-US" smtClean="0"/>
+            <a:pPr lvl="0" eaLnBrk="1" latinLnBrk="0" hangingPunct="1"/>
+            <a:r>
+              <a:rPr kumimoji="0" lang="en-US" smtClean="0"/>
               <a:t>Click to edit Master text styles</a:t>
             </a:r>
           </a:p>
@@ -1418,121 +1461,52 @@
       </p:sp>
       <p:sp>
         <p:nvSpPr>
-          <p:cNvPr id="4" name="Content Placeholder 3"/>
-          <p:cNvSpPr>
-            <a:spLocks noGrp="1"/>
-          </p:cNvSpPr>
-          <p:nvPr>
-            <p:ph sz="half" idx="2"/>
+          <p:cNvPr id="4" name="Text Placeholder 3"/>
+          <p:cNvSpPr>
+            <a:spLocks noGrp="1"/>
+          </p:cNvSpPr>
+          <p:nvPr>
+            <p:ph type="body" sz="half" idx="3"/>
           </p:nvPr>
         </p:nvSpPr>
         <p:spPr>
           <a:xfrm>
-            <a:off x="839788" y="2505075"/>
-            <a:ext cx="5157787" cy="3684588"/>
+            <a:off x="6193368" y="1535113"/>
+            <a:ext cx="5389033" cy="750887"/>
           </a:xfrm>
         </p:spPr>
         <p:txBody>
-          <a:bodyPr/>
-          <a:lstStyle/>
-          <a:p>
-            <a:pPr lvl="0"/>
-            <a:r>
-              <a:rPr lang="en-US" smtClean="0"/>
-              <a:t>Click to edit Master text styles</a:t>
-            </a:r>
-          </a:p>
-          <a:p>
-            <a:pPr lvl="1"/>
-            <a:r>
-              <a:rPr lang="en-US" smtClean="0"/>
-              <a:t>Second level</a:t>
-            </a:r>
-          </a:p>
-          <a:p>
-            <a:pPr lvl="2"/>
-            <a:r>
-              <a:rPr lang="en-US" smtClean="0"/>
-              <a:t>Third level</a:t>
-            </a:r>
-          </a:p>
-          <a:p>
-            <a:pPr lvl="3"/>
-            <a:r>
-              <a:rPr lang="en-US" smtClean="0"/>
-              <a:t>Fourth level</a:t>
-            </a:r>
-          </a:p>
-          <a:p>
-            <a:pPr lvl="4"/>
-            <a:r>
-              <a:rPr lang="en-US" smtClean="0"/>
-              <a:t>Fifth level</a:t>
-            </a:r>
-            <a:endParaRPr lang="en-US"/>
-          </a:p>
-        </p:txBody>
-      </p:sp>
-      <p:sp>
-        <p:nvSpPr>
-          <p:cNvPr id="5" name="Text Placeholder 4"/>
-          <p:cNvSpPr>
-            <a:spLocks noGrp="1"/>
-          </p:cNvSpPr>
-          <p:nvPr>
-            <p:ph type="body" sz="quarter" idx="3"/>
-          </p:nvPr>
-        </p:nvSpPr>
-        <p:spPr>
-          <a:xfrm>
-            <a:off x="6172200" y="1681163"/>
-            <a:ext cx="5183188" cy="823912"/>
-          </a:xfrm>
-        </p:spPr>
-        <p:txBody>
-          <a:bodyPr anchor="b"/>
+          <a:bodyPr anchor="ctr"/>
           <a:lstStyle>
             <a:lvl1pPr marL="0" indent="0">
               <a:buNone/>
-              <a:defRPr sz="2400" b="1"/>
+              <a:defRPr sz="2400" b="0" cap="all" baseline="0">
+                <a:solidFill>
+                  <a:schemeClr val="tx1"/>
+                </a:solidFill>
+              </a:defRPr>
             </a:lvl1pPr>
-            <a:lvl2pPr marL="457200" indent="0">
+            <a:lvl2pPr>
               <a:buNone/>
               <a:defRPr sz="2000" b="1"/>
             </a:lvl2pPr>
-            <a:lvl3pPr marL="914400" indent="0">
+            <a:lvl3pPr>
               <a:buNone/>
               <a:defRPr sz="1800" b="1"/>
             </a:lvl3pPr>
-            <a:lvl4pPr marL="1371600" indent="0">
+            <a:lvl4pPr>
               <a:buNone/>
               <a:defRPr sz="1600" b="1"/>
             </a:lvl4pPr>
-            <a:lvl5pPr marL="1828800" indent="0">
+            <a:lvl5pPr>
               <a:buNone/>
               <a:defRPr sz="1600" b="1"/>
             </a:lvl5pPr>
-            <a:lvl6pPr marL="2286000" indent="0">
-              <a:buNone/>
-              <a:defRPr sz="1600" b="1"/>
-            </a:lvl6pPr>
-            <a:lvl7pPr marL="2743200" indent="0">
-              <a:buNone/>
-              <a:defRPr sz="1600" b="1"/>
-            </a:lvl7pPr>
-            <a:lvl8pPr marL="3200400" indent="0">
-              <a:buNone/>
-              <a:defRPr sz="1600" b="1"/>
-            </a:lvl8pPr>
-            <a:lvl9pPr marL="3657600" indent="0">
-              <a:buNone/>
-              <a:defRPr sz="1600" b="1"/>
-            </a:lvl9pPr>
           </a:lstStyle>
           <a:p>
-            <a:pPr lvl="0"/>
-            <a:r>
-              <a:rPr lang="en-US" smtClean="0"/>
+            <a:pPr lvl="0" eaLnBrk="1" latinLnBrk="0" hangingPunct="1"/>
+            <a:r>
+              <a:rPr kumimoji="0" lang="en-US" smtClean="0"/>
               <a:t>Click to edit Master text styles</a:t>
             </a:r>
           </a:p>
@@ -1540,58 +1514,147 @@
       </p:sp>
       <p:sp>
         <p:nvSpPr>
-          <p:cNvPr id="6" name="Content Placeholder 5"/>
-          <p:cNvSpPr>
-            <a:spLocks noGrp="1"/>
-          </p:cNvSpPr>
-          <p:nvPr>
-            <p:ph sz="quarter" idx="4"/>
+          <p:cNvPr id="5" name="Content Placeholder 4"/>
+          <p:cNvSpPr>
+            <a:spLocks noGrp="1"/>
+          </p:cNvSpPr>
+          <p:nvPr>
+            <p:ph sz="quarter" idx="2"/>
           </p:nvPr>
         </p:nvSpPr>
         <p:spPr>
           <a:xfrm>
-            <a:off x="6172200" y="2505075"/>
-            <a:ext cx="5183188" cy="3684588"/>
+            <a:off x="609600" y="2362201"/>
+            <a:ext cx="5386917" cy="3763963"/>
           </a:xfrm>
         </p:spPr>
         <p:txBody>
           <a:bodyPr/>
-          <a:lstStyle/>
-          <a:p>
-            <a:pPr lvl="0"/>
+          <a:lstStyle>
+            <a:lvl1pPr>
+              <a:defRPr sz="2400"/>
+            </a:lvl1pPr>
+            <a:lvl2pPr>
+              <a:defRPr sz="2000"/>
+            </a:lvl2pPr>
+            <a:lvl3pPr>
+              <a:defRPr sz="1800"/>
+            </a:lvl3pPr>
+            <a:lvl4pPr>
+              <a:defRPr sz="1600"/>
+            </a:lvl4pPr>
+            <a:lvl5pPr>
+              <a:defRPr sz="1600"/>
+            </a:lvl5pPr>
+          </a:lstStyle>
+          <a:p>
+            <a:pPr lvl="0" eaLnBrk="1" latinLnBrk="0" hangingPunct="1"/>
             <a:r>
               <a:rPr lang="en-US" smtClean="0"/>
               <a:t>Click to edit Master text styles</a:t>
             </a:r>
           </a:p>
           <a:p>
-            <a:pPr lvl="1"/>
+            <a:pPr lvl="1" eaLnBrk="1" latinLnBrk="0" hangingPunct="1"/>
             <a:r>
               <a:rPr lang="en-US" smtClean="0"/>
               <a:t>Second level</a:t>
             </a:r>
           </a:p>
           <a:p>
-            <a:pPr lvl="2"/>
+            <a:pPr lvl="2" eaLnBrk="1" latinLnBrk="0" hangingPunct="1"/>
             <a:r>
               <a:rPr lang="en-US" smtClean="0"/>
               <a:t>Third level</a:t>
             </a:r>
           </a:p>
           <a:p>
-            <a:pPr lvl="3"/>
+            <a:pPr lvl="3" eaLnBrk="1" latinLnBrk="0" hangingPunct="1"/>
             <a:r>
               <a:rPr lang="en-US" smtClean="0"/>
               <a:t>Fourth level</a:t>
             </a:r>
           </a:p>
           <a:p>
-            <a:pPr lvl="4"/>
+            <a:pPr lvl="4" eaLnBrk="1" latinLnBrk="0" hangingPunct="1"/>
             <a:r>
               <a:rPr lang="en-US" smtClean="0"/>
               <a:t>Fifth level</a:t>
             </a:r>
-            <a:endParaRPr lang="en-US"/>
+            <a:endParaRPr kumimoji="0" lang="en-US"/>
+          </a:p>
+        </p:txBody>
+      </p:sp>
+      <p:sp>
+        <p:nvSpPr>
+          <p:cNvPr id="6" name="Content Placeholder 5"/>
+          <p:cNvSpPr>
+            <a:spLocks noGrp="1"/>
+          </p:cNvSpPr>
+          <p:nvPr>
+            <p:ph sz="quarter" idx="4"/>
+          </p:nvPr>
+        </p:nvSpPr>
+        <p:spPr>
+          <a:xfrm>
+            <a:off x="6193368" y="2362201"/>
+            <a:ext cx="5389033" cy="3763963"/>
+          </a:xfrm>
+        </p:spPr>
+        <p:txBody>
+          <a:bodyPr/>
+          <a:lstStyle>
+            <a:lvl1pPr>
+              <a:defRPr sz="2400"/>
+            </a:lvl1pPr>
+            <a:lvl2pPr>
+              <a:defRPr sz="2000"/>
+            </a:lvl2pPr>
+            <a:lvl3pPr>
+              <a:defRPr sz="1800"/>
+            </a:lvl3pPr>
+            <a:lvl4pPr>
+              <a:defRPr sz="1600"/>
+            </a:lvl4pPr>
+            <a:lvl5pPr>
+              <a:defRPr sz="1600"/>
+            </a:lvl5pPr>
+          </a:lstStyle>
+          <a:p>
+            <a:pPr lvl="0" eaLnBrk="1" latinLnBrk="0" hangingPunct="1"/>
+            <a:r>
+              <a:rPr lang="en-US" smtClean="0"/>
+              <a:t>Click to edit Master text styles</a:t>
+            </a:r>
+          </a:p>
+          <a:p>
+            <a:pPr lvl="1" eaLnBrk="1" latinLnBrk="0" hangingPunct="1"/>
+            <a:r>
+              <a:rPr lang="en-US" smtClean="0"/>
+              <a:t>Second level</a:t>
+            </a:r>
+          </a:p>
+          <a:p>
+            <a:pPr lvl="2" eaLnBrk="1" latinLnBrk="0" hangingPunct="1"/>
+            <a:r>
+              <a:rPr lang="en-US" smtClean="0"/>
+              <a:t>Third level</a:t>
+            </a:r>
+          </a:p>
+          <a:p>
+            <a:pPr lvl="3" eaLnBrk="1" latinLnBrk="0" hangingPunct="1"/>
+            <a:r>
+              <a:rPr lang="en-US" smtClean="0"/>
+              <a:t>Fourth level</a:t>
+            </a:r>
+          </a:p>
+          <a:p>
+            <a:pPr lvl="4" eaLnBrk="1" latinLnBrk="0" hangingPunct="1"/>
+            <a:r>
+              <a:rPr lang="en-US" smtClean="0"/>
+              <a:t>Fifth level</a:t>
+            </a:r>
+            <a:endParaRPr kumimoji="0" lang="en-US"/>
           </a:p>
         </p:txBody>
       </p:sp>
@@ -1612,7 +1675,7 @@
           <a:p>
             <a:fld id="{64F4A515-AF31-469B-9337-896FE1DBE917}" type="datetimeFigureOut">
               <a:rPr lang="en-US" smtClean="0"/>
-              <a:t>4/20/2013</a:t>
+              <a:t>4/21/2013</a:t>
             </a:fld>
             <a:endParaRPr lang="en-US"/>
           </a:p>
@@ -1661,11 +1724,6 @@
         </p:txBody>
       </p:sp>
     </p:spTree>
-    <p:extLst>
-      <p:ext uri="{BB962C8B-B14F-4D97-AF65-F5344CB8AC3E}">
-        <p14:creationId xmlns:p14="http://schemas.microsoft.com/office/powerpoint/2010/main" val="2071836782"/>
-      </p:ext>
-    </p:extLst>
   </p:cSld>
   <p:clrMapOvr>
     <a:masterClrMapping/>
@@ -1706,10 +1764,10 @@
           <a:lstStyle/>
           <a:p>
             <a:r>
-              <a:rPr lang="en-US" smtClean="0"/>
+              <a:rPr kumimoji="0" lang="en-US" smtClean="0"/>
               <a:t>Click to edit Master title style</a:t>
             </a:r>
-            <a:endParaRPr lang="en-US"/>
+            <a:endParaRPr kumimoji="0" lang="en-US"/>
           </a:p>
         </p:txBody>
       </p:sp>
@@ -1730,7 +1788,7 @@
           <a:p>
             <a:fld id="{64F4A515-AF31-469B-9337-896FE1DBE917}" type="datetimeFigureOut">
               <a:rPr lang="en-US" smtClean="0"/>
-              <a:t>4/20/2013</a:t>
+              <a:t>4/21/2013</a:t>
             </a:fld>
             <a:endParaRPr lang="en-US"/>
           </a:p>
@@ -1779,11 +1837,6 @@
         </p:txBody>
       </p:sp>
     </p:spTree>
-    <p:extLst>
-      <p:ext uri="{BB962C8B-B14F-4D97-AF65-F5344CB8AC3E}">
-        <p14:creationId xmlns:p14="http://schemas.microsoft.com/office/powerpoint/2010/main" val="1932460310"/>
-      </p:ext>
-    </p:extLst>
   </p:cSld>
   <p:clrMapOvr>
     <a:masterClrMapping/>
@@ -1825,7 +1878,7 @@
           <a:p>
             <a:fld id="{64F4A515-AF31-469B-9337-896FE1DBE917}" type="datetimeFigureOut">
               <a:rPr lang="en-US" smtClean="0"/>
-              <a:t>4/20/2013</a:t>
+              <a:t>4/21/2013</a:t>
             </a:fld>
             <a:endParaRPr lang="en-US"/>
           </a:p>
@@ -1874,11 +1927,6 @@
         </p:txBody>
       </p:sp>
     </p:spTree>
-    <p:extLst>
-      <p:ext uri="{BB962C8B-B14F-4D97-AF65-F5344CB8AC3E}">
-        <p14:creationId xmlns:p14="http://schemas.microsoft.com/office/powerpoint/2010/main" val="2560955690"/>
-      </p:ext>
-    </p:extLst>
   </p:cSld>
   <p:clrMapOvr>
     <a:masterClrMapping/>
@@ -1915,173 +1963,159 @@
         </p:nvSpPr>
         <p:spPr>
           <a:xfrm>
-            <a:off x="839788" y="457200"/>
-            <a:ext cx="3932237" cy="1600200"/>
+            <a:off x="609601" y="273050"/>
+            <a:ext cx="4011084" cy="1162050"/>
           </a:xfrm>
         </p:spPr>
         <p:txBody>
-          <a:bodyPr anchor="b"/>
+          <a:bodyPr vert="horz" anchor="b">
+            <a:normAutofit/>
+            <a:sp3d prstMaterial="softEdge"/>
+          </a:bodyPr>
+          <a:lstStyle>
+            <a:lvl1pPr algn="l">
+              <a:buNone/>
+              <a:defRPr sz="2200" b="0">
+                <a:ln w="6350">
+                  <a:noFill/>
+                </a:ln>
+                <a:solidFill>
+                  <a:schemeClr val="accent1">
+                    <a:tint val="73000"/>
+                    <a:satMod val="180000"/>
+                  </a:schemeClr>
+                </a:solidFill>
+              </a:defRPr>
+            </a:lvl1pPr>
+          </a:lstStyle>
+          <a:p>
+            <a:r>
+              <a:rPr kumimoji="0" lang="en-US" smtClean="0"/>
+              <a:t>Click to edit Master title style</a:t>
+            </a:r>
+            <a:endParaRPr kumimoji="0" lang="en-US"/>
+          </a:p>
+        </p:txBody>
+      </p:sp>
+      <p:sp>
+        <p:nvSpPr>
+          <p:cNvPr id="3" name="Text Placeholder 2"/>
+          <p:cNvSpPr>
+            <a:spLocks noGrp="1"/>
+          </p:cNvSpPr>
+          <p:nvPr>
+            <p:ph type="body" idx="2"/>
+          </p:nvPr>
+        </p:nvSpPr>
+        <p:spPr>
+          <a:xfrm>
+            <a:off x="609601" y="1524001"/>
+            <a:ext cx="4011084" cy="4602163"/>
+          </a:xfrm>
+        </p:spPr>
+        <p:txBody>
+          <a:bodyPr/>
+          <a:lstStyle>
+            <a:lvl1pPr marL="0" indent="0">
+              <a:buNone/>
+              <a:defRPr sz="1400"/>
+            </a:lvl1pPr>
+            <a:lvl2pPr>
+              <a:buNone/>
+              <a:defRPr sz="1200"/>
+            </a:lvl2pPr>
+            <a:lvl3pPr>
+              <a:buNone/>
+              <a:defRPr sz="1000"/>
+            </a:lvl3pPr>
+            <a:lvl4pPr>
+              <a:buNone/>
+              <a:defRPr sz="900"/>
+            </a:lvl4pPr>
+            <a:lvl5pPr>
+              <a:buNone/>
+              <a:defRPr sz="900"/>
+            </a:lvl5pPr>
+          </a:lstStyle>
+          <a:p>
+            <a:pPr lvl="0" eaLnBrk="1" latinLnBrk="0" hangingPunct="1"/>
+            <a:r>
+              <a:rPr kumimoji="0" lang="en-US" smtClean="0"/>
+              <a:t>Click to edit Master text styles</a:t>
+            </a:r>
+          </a:p>
+        </p:txBody>
+      </p:sp>
+      <p:sp>
+        <p:nvSpPr>
+          <p:cNvPr id="4" name="Content Placeholder 3"/>
+          <p:cNvSpPr>
+            <a:spLocks noGrp="1"/>
+          </p:cNvSpPr>
+          <p:nvPr>
+            <p:ph sz="half" idx="1"/>
+          </p:nvPr>
+        </p:nvSpPr>
+        <p:spPr>
+          <a:xfrm>
+            <a:off x="4766733" y="273051"/>
+            <a:ext cx="6815667" cy="5853113"/>
+          </a:xfrm>
+        </p:spPr>
+        <p:txBody>
+          <a:bodyPr/>
           <a:lstStyle>
             <a:lvl1pPr>
-              <a:defRPr sz="3200"/>
-            </a:lvl1pPr>
-          </a:lstStyle>
-          <a:p>
-            <a:r>
-              <a:rPr lang="en-US" smtClean="0"/>
-              <a:t>Click to edit Master title style</a:t>
-            </a:r>
-            <a:endParaRPr lang="en-US"/>
-          </a:p>
-        </p:txBody>
-      </p:sp>
-      <p:sp>
-        <p:nvSpPr>
-          <p:cNvPr id="3" name="Content Placeholder 2"/>
-          <p:cNvSpPr>
-            <a:spLocks noGrp="1"/>
-          </p:cNvSpPr>
-          <p:nvPr>
-            <p:ph idx="1"/>
-          </p:nvPr>
-        </p:nvSpPr>
-        <p:spPr>
-          <a:xfrm>
-            <a:off x="5183188" y="987425"/>
-            <a:ext cx="6172200" cy="4873625"/>
-          </a:xfrm>
-        </p:spPr>
-        <p:txBody>
-          <a:bodyPr/>
-          <a:lstStyle>
-            <a:lvl1pPr>
-              <a:defRPr sz="3200"/>
+              <a:defRPr sz="2600"/>
             </a:lvl1pPr>
             <a:lvl2pPr>
-              <a:defRPr sz="2800"/>
+              <a:defRPr sz="2400"/>
             </a:lvl2pPr>
             <a:lvl3pPr>
-              <a:defRPr sz="2400"/>
+              <a:defRPr sz="2200"/>
             </a:lvl3pPr>
             <a:lvl4pPr>
               <a:defRPr sz="2000"/>
             </a:lvl4pPr>
             <a:lvl5pPr>
-              <a:defRPr sz="2000"/>
+              <a:defRPr sz="1800"/>
             </a:lvl5pPr>
-            <a:lvl6pPr>
-              <a:defRPr sz="2000"/>
-            </a:lvl6pPr>
-            <a:lvl7pPr>
-              <a:defRPr sz="2000"/>
-            </a:lvl7pPr>
-            <a:lvl8pPr>
-              <a:defRPr sz="2000"/>
-            </a:lvl8pPr>
-            <a:lvl9pPr>
-              <a:defRPr sz="2000"/>
-            </a:lvl9pPr>
           </a:lstStyle>
           <a:p>
-            <a:pPr lvl="0"/>
+            <a:pPr lvl="0" eaLnBrk="1" latinLnBrk="0" hangingPunct="1"/>
             <a:r>
               <a:rPr lang="en-US" smtClean="0"/>
               <a:t>Click to edit Master text styles</a:t>
             </a:r>
           </a:p>
           <a:p>
-            <a:pPr lvl="1"/>
+            <a:pPr lvl="1" eaLnBrk="1" latinLnBrk="0" hangingPunct="1"/>
             <a:r>
               <a:rPr lang="en-US" smtClean="0"/>
               <a:t>Second level</a:t>
             </a:r>
           </a:p>
           <a:p>
-            <a:pPr lvl="2"/>
+            <a:pPr lvl="2" eaLnBrk="1" latinLnBrk="0" hangingPunct="1"/>
             <a:r>
               <a:rPr lang="en-US" smtClean="0"/>
               <a:t>Third level</a:t>
             </a:r>
           </a:p>
           <a:p>
-            <a:pPr lvl="3"/>
+            <a:pPr lvl="3" eaLnBrk="1" latinLnBrk="0" hangingPunct="1"/>
             <a:r>
               <a:rPr lang="en-US" smtClean="0"/>
               <a:t>Fourth level</a:t>
             </a:r>
           </a:p>
           <a:p>
-            <a:pPr lvl="4"/>
+            <a:pPr lvl="4" eaLnBrk="1" latinLnBrk="0" hangingPunct="1"/>
             <a:r>
               <a:rPr lang="en-US" smtClean="0"/>
               <a:t>Fifth level</a:t>
             </a:r>
-            <a:endParaRPr lang="en-US"/>
-          </a:p>
-        </p:txBody>
-      </p:sp>
-      <p:sp>
-        <p:nvSpPr>
-          <p:cNvPr id="4" name="Text Placeholder 3"/>
-          <p:cNvSpPr>
-            <a:spLocks noGrp="1"/>
-          </p:cNvSpPr>
-          <p:nvPr>
-            <p:ph type="body" sz="half" idx="2"/>
-          </p:nvPr>
-        </p:nvSpPr>
-        <p:spPr>
-          <a:xfrm>
-            <a:off x="839788" y="2057400"/>
-            <a:ext cx="3932237" cy="3811588"/>
-          </a:xfrm>
-        </p:spPr>
-        <p:txBody>
-          <a:bodyPr/>
-          <a:lstStyle>
-            <a:lvl1pPr marL="0" indent="0">
-              <a:buNone/>
-              <a:defRPr sz="1600"/>
-            </a:lvl1pPr>
-            <a:lvl2pPr marL="457200" indent="0">
-              <a:buNone/>
-              <a:defRPr sz="1400"/>
-            </a:lvl2pPr>
-            <a:lvl3pPr marL="914400" indent="0">
-              <a:buNone/>
-              <a:defRPr sz="1200"/>
-            </a:lvl3pPr>
-            <a:lvl4pPr marL="1371600" indent="0">
-              <a:buNone/>
-              <a:defRPr sz="1000"/>
-            </a:lvl4pPr>
-            <a:lvl5pPr marL="1828800" indent="0">
-              <a:buNone/>
-              <a:defRPr sz="1000"/>
-            </a:lvl5pPr>
-            <a:lvl6pPr marL="2286000" indent="0">
-              <a:buNone/>
-              <a:defRPr sz="1000"/>
-            </a:lvl6pPr>
-            <a:lvl7pPr marL="2743200" indent="0">
-              <a:buNone/>
-              <a:defRPr sz="1000"/>
-            </a:lvl7pPr>
-            <a:lvl8pPr marL="3200400" indent="0">
-              <a:buNone/>
-              <a:defRPr sz="1000"/>
-            </a:lvl8pPr>
-            <a:lvl9pPr marL="3657600" indent="0">
-              <a:buNone/>
-              <a:defRPr sz="1000"/>
-            </a:lvl9pPr>
-          </a:lstStyle>
-          <a:p>
-            <a:pPr lvl="0"/>
-            <a:r>
-              <a:rPr lang="en-US" smtClean="0"/>
-              <a:t>Click to edit Master text styles</a:t>
-            </a:r>
+            <a:endParaRPr kumimoji="0" lang="en-US"/>
           </a:p>
         </p:txBody>
       </p:sp>
@@ -2102,7 +2136,7 @@
           <a:p>
             <a:fld id="{64F4A515-AF31-469B-9337-896FE1DBE917}" type="datetimeFigureOut">
               <a:rPr lang="en-US" smtClean="0"/>
-              <a:t>4/20/2013</a:t>
+              <a:t>4/21/2013</a:t>
             </a:fld>
             <a:endParaRPr lang="en-US"/>
           </a:p>
@@ -2151,11 +2185,6 @@
         </p:txBody>
       </p:sp>
     </p:spTree>
-    <p:extLst>
-      <p:ext uri="{BB962C8B-B14F-4D97-AF65-F5344CB8AC3E}">
-        <p14:creationId xmlns:p14="http://schemas.microsoft.com/office/powerpoint/2010/main" val="4138385730"/>
-      </p:ext>
-    </p:extLst>
   </p:cSld>
   <p:clrMapOvr>
     <a:masterClrMapping/>
@@ -2192,147 +2221,163 @@
         </p:nvSpPr>
         <p:spPr>
           <a:xfrm>
-            <a:off x="839788" y="457200"/>
-            <a:ext cx="3932237" cy="1600200"/>
+            <a:off x="2438400" y="609600"/>
+            <a:ext cx="7315200" cy="522288"/>
           </a:xfrm>
         </p:spPr>
         <p:txBody>
-          <a:bodyPr anchor="b"/>
+          <a:bodyPr lIns="45720" rIns="45720" bIns="0" anchor="b">
+            <a:sp3d prstMaterial="softEdge"/>
+          </a:bodyPr>
           <a:lstStyle>
-            <a:lvl1pPr>
+            <a:lvl1pPr algn="ctr">
+              <a:buNone/>
+              <a:defRPr sz="2000" b="1"/>
+            </a:lvl1pPr>
+          </a:lstStyle>
+          <a:p>
+            <a:r>
+              <a:rPr kumimoji="0" lang="en-US" smtClean="0"/>
+              <a:t>Click to edit Master title style</a:t>
+            </a:r>
+            <a:endParaRPr kumimoji="0" lang="en-US"/>
+          </a:p>
+        </p:txBody>
+      </p:sp>
+      <p:sp>
+        <p:nvSpPr>
+          <p:cNvPr id="3" name="Picture Placeholder 2"/>
+          <p:cNvSpPr>
+            <a:spLocks noGrp="1"/>
+          </p:cNvSpPr>
+          <p:nvPr>
+            <p:ph type="pic" idx="1"/>
+          </p:nvPr>
+        </p:nvSpPr>
+        <p:spPr>
+          <a:xfrm>
+            <a:off x="2438400" y="1831975"/>
+            <a:ext cx="7315200" cy="3962400"/>
+          </a:xfrm>
+          <a:solidFill>
+            <a:schemeClr val="bg2"/>
+          </a:solidFill>
+          <a:ln w="44450" cap="sq" cmpd="sng" algn="ctr">
+            <a:solidFill>
+              <a:srgbClr val="FFFFFF"/>
+            </a:solidFill>
+            <a:prstDash val="solid"/>
+            <a:miter lim="800000"/>
+          </a:ln>
+          <a:effectLst>
+            <a:outerShdw blurRad="190500" dist="228600" dir="2700000" sy="90000">
+              <a:srgbClr val="000000">
+                <a:alpha val="25000"/>
+              </a:srgbClr>
+            </a:outerShdw>
+          </a:effectLst>
+          <a:scene3d>
+            <a:camera prst="orthographicFront">
+              <a:rot lat="0" lon="0" rev="0"/>
+            </a:camera>
+            <a:lightRig rig="balanced" dir="tr">
+              <a:rot lat="0" lon="0" rev="2700000"/>
+            </a:lightRig>
+          </a:scene3d>
+          <a:sp3d prstMaterial="matte">
+            <a:contourClr>
+              <a:schemeClr val="tx2">
+                <a:shade val="50000"/>
+              </a:schemeClr>
+            </a:contourClr>
+          </a:sp3d>
+        </p:spPr>
+        <p:style>
+          <a:lnRef idx="3">
+            <a:schemeClr val="lt1"/>
+          </a:lnRef>
+          <a:fillRef idx="1">
+            <a:schemeClr val="accent1"/>
+          </a:fillRef>
+          <a:effectRef idx="1">
+            <a:schemeClr val="accent1"/>
+          </a:effectRef>
+          <a:fontRef idx="minor">
+            <a:schemeClr val="lt1"/>
+          </a:fontRef>
+        </p:style>
+        <p:txBody>
+          <a:bodyPr anchor="t"/>
+          <a:lstStyle>
+            <a:lvl1pPr indent="0">
+              <a:buNone/>
               <a:defRPr sz="3200"/>
             </a:lvl1pPr>
           </a:lstStyle>
           <a:p>
-            <a:r>
-              <a:rPr lang="en-US" smtClean="0"/>
-              <a:t>Click to edit Master title style</a:t>
-            </a:r>
-            <a:endParaRPr lang="en-US"/>
-          </a:p>
-        </p:txBody>
-      </p:sp>
-      <p:sp>
-        <p:nvSpPr>
-          <p:cNvPr id="3" name="Picture Placeholder 2"/>
-          <p:cNvSpPr>
-            <a:spLocks noGrp="1"/>
-          </p:cNvSpPr>
-          <p:nvPr>
-            <p:ph type="pic" idx="1"/>
+            <a:pPr marL="0" algn="l" rtl="0" eaLnBrk="1" latinLnBrk="0" hangingPunct="1"/>
+            <a:r>
+              <a:rPr kumimoji="0" lang="en-US" smtClean="0">
+                <a:solidFill>
+                  <a:schemeClr val="lt1"/>
+                </a:solidFill>
+                <a:latin typeface="+mn-lt"/>
+                <a:ea typeface="+mn-ea"/>
+                <a:cs typeface="+mn-cs"/>
+              </a:rPr>
+              <a:t>Click icon to add picture</a:t>
+            </a:r>
+            <a:endParaRPr kumimoji="0" lang="en-US" dirty="0">
+              <a:solidFill>
+                <a:schemeClr val="lt1"/>
+              </a:solidFill>
+              <a:latin typeface="+mn-lt"/>
+              <a:ea typeface="+mn-ea"/>
+              <a:cs typeface="+mn-cs"/>
+            </a:endParaRPr>
+          </a:p>
+        </p:txBody>
+      </p:sp>
+      <p:sp>
+        <p:nvSpPr>
+          <p:cNvPr id="4" name="Text Placeholder 3"/>
+          <p:cNvSpPr>
+            <a:spLocks noGrp="1"/>
+          </p:cNvSpPr>
+          <p:nvPr>
+            <p:ph type="body" sz="half" idx="2"/>
           </p:nvPr>
         </p:nvSpPr>
         <p:spPr>
           <a:xfrm>
-            <a:off x="5183188" y="987425"/>
-            <a:ext cx="6172200" cy="4873625"/>
+            <a:off x="2438400" y="1166787"/>
+            <a:ext cx="7315200" cy="530352"/>
           </a:xfrm>
         </p:spPr>
         <p:txBody>
-          <a:bodyPr/>
+          <a:bodyPr lIns="45720" tIns="45720" rIns="45720" anchor="t"/>
           <a:lstStyle>
-            <a:lvl1pPr marL="0" indent="0">
-              <a:buNone/>
-              <a:defRPr sz="3200"/>
-            </a:lvl1pPr>
-            <a:lvl2pPr marL="457200" indent="0">
-              <a:buNone/>
-              <a:defRPr sz="2800"/>
-            </a:lvl2pPr>
-            <a:lvl3pPr marL="914400" indent="0">
-              <a:buNone/>
-              <a:defRPr sz="2400"/>
-            </a:lvl3pPr>
-            <a:lvl4pPr marL="1371600" indent="0">
-              <a:buNone/>
-              <a:defRPr sz="2000"/>
-            </a:lvl4pPr>
-            <a:lvl5pPr marL="1828800" indent="0">
-              <a:buNone/>
-              <a:defRPr sz="2000"/>
-            </a:lvl5pPr>
-            <a:lvl6pPr marL="2286000" indent="0">
-              <a:buNone/>
-              <a:defRPr sz="2000"/>
-            </a:lvl6pPr>
-            <a:lvl7pPr marL="2743200" indent="0">
-              <a:buNone/>
-              <a:defRPr sz="2000"/>
-            </a:lvl7pPr>
-            <a:lvl8pPr marL="3200400" indent="0">
-              <a:buNone/>
-              <a:defRPr sz="2000"/>
-            </a:lvl8pPr>
-            <a:lvl9pPr marL="3657600" indent="0">
-              <a:buNone/>
-              <a:defRPr sz="2000"/>
-            </a:lvl9pPr>
-          </a:lstStyle>
-          <a:p>
-            <a:endParaRPr lang="en-US"/>
-          </a:p>
-        </p:txBody>
-      </p:sp>
-      <p:sp>
-        <p:nvSpPr>
-          <p:cNvPr id="4" name="Text Placeholder 3"/>
-          <p:cNvSpPr>
-            <a:spLocks noGrp="1"/>
-          </p:cNvSpPr>
-          <p:nvPr>
-            <p:ph type="body" sz="half" idx="2"/>
-          </p:nvPr>
-        </p:nvSpPr>
-        <p:spPr>
-          <a:xfrm>
-            <a:off x="839788" y="2057400"/>
-            <a:ext cx="3932237" cy="3811588"/>
-          </a:xfrm>
-        </p:spPr>
-        <p:txBody>
-          <a:bodyPr/>
-          <a:lstStyle>
-            <a:lvl1pPr marL="0" indent="0">
-              <a:buNone/>
-              <a:defRPr sz="1600"/>
-            </a:lvl1pPr>
-            <a:lvl2pPr marL="457200" indent="0">
+            <a:lvl1pPr marL="0" indent="0" algn="ctr">
               <a:buNone/>
               <a:defRPr sz="1400"/>
+            </a:lvl1pPr>
+            <a:lvl2pPr>
+              <a:defRPr sz="1200"/>
             </a:lvl2pPr>
-            <a:lvl3pPr marL="914400" indent="0">
-              <a:buNone/>
-              <a:defRPr sz="1200"/>
+            <a:lvl3pPr>
+              <a:defRPr sz="1000"/>
             </a:lvl3pPr>
-            <a:lvl4pPr marL="1371600" indent="0">
-              <a:buNone/>
-              <a:defRPr sz="1000"/>
+            <a:lvl4pPr>
+              <a:defRPr sz="900"/>
             </a:lvl4pPr>
-            <a:lvl5pPr marL="1828800" indent="0">
-              <a:buNone/>
-              <a:defRPr sz="1000"/>
+            <a:lvl5pPr>
+              <a:defRPr sz="900"/>
             </a:lvl5pPr>
-            <a:lvl6pPr marL="2286000" indent="0">
-              <a:buNone/>
-              <a:defRPr sz="1000"/>
-            </a:lvl6pPr>
-            <a:lvl7pPr marL="2743200" indent="0">
-              <a:buNone/>
-              <a:defRPr sz="1000"/>
-            </a:lvl7pPr>
-            <a:lvl8pPr marL="3200400" indent="0">
-              <a:buNone/>
-              <a:defRPr sz="1000"/>
-            </a:lvl8pPr>
-            <a:lvl9pPr marL="3657600" indent="0">
-              <a:buNone/>
-              <a:defRPr sz="1000"/>
-            </a:lvl9pPr>
           </a:lstStyle>
           <a:p>
-            <a:pPr lvl="0"/>
-            <a:r>
-              <a:rPr lang="en-US" smtClean="0"/>
+            <a:pPr lvl="0" eaLnBrk="1" latinLnBrk="0" hangingPunct="1"/>
+            <a:r>
+              <a:rPr kumimoji="0" lang="en-US" smtClean="0"/>
               <a:t>Click to edit Master text styles</a:t>
             </a:r>
           </a:p>
@@ -2355,7 +2400,7 @@
           <a:p>
             <a:fld id="{64F4A515-AF31-469B-9337-896FE1DBE917}" type="datetimeFigureOut">
               <a:rPr lang="en-US" smtClean="0"/>
-              <a:t>4/20/2013</a:t>
+              <a:t>4/21/2013</a:t>
             </a:fld>
             <a:endParaRPr lang="en-US"/>
           </a:p>
@@ -2404,11 +2449,6 @@
         </p:txBody>
       </p:sp>
     </p:spTree>
-    <p:extLst>
-      <p:ext uri="{BB962C8B-B14F-4D97-AF65-F5344CB8AC3E}">
-        <p14:creationId xmlns:p14="http://schemas.microsoft.com/office/powerpoint/2010/main" val="2609635012"/>
-      </p:ext>
-    </p:extLst>
   </p:cSld>
   <p:clrMapOvr>
     <a:masterClrMapping/>
@@ -2420,8 +2460,8 @@
 <p:sldMaster xmlns:a="http://schemas.openxmlformats.org/drawingml/2006/main" xmlns:r="http://schemas.openxmlformats.org/officeDocument/2006/relationships" xmlns:p="http://schemas.openxmlformats.org/presentationml/2006/main">
   <p:cSld>
     <p:bg>
-      <p:bgRef idx="1001">
-        <a:schemeClr val="bg1"/>
+      <p:bgRef idx="1003">
+        <a:schemeClr val="bg2"/>
       </p:bgRef>
     </p:bg>
     <p:spTree>
@@ -2440,7 +2480,7 @@
       </p:grpSpPr>
       <p:sp>
         <p:nvSpPr>
-          <p:cNvPr id="2" name="Title Placeholder 1"/>
+          <p:cNvPr id="22" name="Title Placeholder 21"/>
           <p:cNvSpPr>
             <a:spLocks noGrp="1"/>
           </p:cNvSpPr>
@@ -2450,30 +2490,39 @@
         </p:nvSpPr>
         <p:spPr>
           <a:xfrm>
-            <a:off x="838200" y="365125"/>
-            <a:ext cx="10515600" cy="1325563"/>
+            <a:off x="609600" y="274638"/>
+            <a:ext cx="10972800" cy="1143000"/>
           </a:xfrm>
           <a:prstGeom prst="rect">
             <a:avLst/>
           </a:prstGeom>
         </p:spPr>
         <p:txBody>
-          <a:bodyPr vert="horz" lIns="91440" tIns="45720" rIns="91440" bIns="45720" rtlCol="0" anchor="ctr">
+          <a:bodyPr vert="horz" anchor="ctr">
             <a:normAutofit/>
+            <a:scene3d>
+              <a:camera prst="orthographicFront"/>
+              <a:lightRig rig="soft" dir="t">
+                <a:rot lat="0" lon="0" rev="16800000"/>
+              </a:lightRig>
+            </a:scene3d>
+            <a:sp3d prstMaterial="softEdge">
+              <a:bevelT w="38100" h="38100"/>
+            </a:sp3d>
           </a:bodyPr>
           <a:lstStyle/>
           <a:p>
             <a:r>
-              <a:rPr lang="en-US" smtClean="0"/>
+              <a:rPr kumimoji="0" lang="en-US" smtClean="0"/>
               <a:t>Click to edit Master title style</a:t>
             </a:r>
-            <a:endParaRPr lang="en-US"/>
-          </a:p>
-        </p:txBody>
-      </p:sp>
-      <p:sp>
-        <p:nvSpPr>
-          <p:cNvPr id="3" name="Text Placeholder 2"/>
+            <a:endParaRPr kumimoji="0" lang="en-US"/>
+          </a:p>
+        </p:txBody>
+      </p:sp>
+      <p:sp>
+        <p:nvSpPr>
+          <p:cNvPr id="13" name="Text Placeholder 12"/>
           <p:cNvSpPr>
             <a:spLocks noGrp="1"/>
           </p:cNvSpPr>
@@ -2483,59 +2532,59 @@
         </p:nvSpPr>
         <p:spPr>
           <a:xfrm>
-            <a:off x="838200" y="1825625"/>
-            <a:ext cx="10515600" cy="4351338"/>
+            <a:off x="609600" y="1600200"/>
+            <a:ext cx="10972800" cy="4709160"/>
           </a:xfrm>
           <a:prstGeom prst="rect">
             <a:avLst/>
           </a:prstGeom>
         </p:spPr>
         <p:txBody>
-          <a:bodyPr vert="horz" lIns="91440" tIns="45720" rIns="91440" bIns="45720" rtlCol="0">
+          <a:bodyPr vert="horz">
             <a:normAutofit/>
           </a:bodyPr>
           <a:lstStyle/>
           <a:p>
-            <a:pPr lvl="0"/>
-            <a:r>
-              <a:rPr lang="en-US" smtClean="0"/>
+            <a:pPr lvl="0" eaLnBrk="1" latinLnBrk="0" hangingPunct="1"/>
+            <a:r>
+              <a:rPr kumimoji="0" lang="en-US" smtClean="0"/>
               <a:t>Click to edit Master text styles</a:t>
             </a:r>
           </a:p>
           <a:p>
-            <a:pPr lvl="1"/>
-            <a:r>
-              <a:rPr lang="en-US" smtClean="0"/>
+            <a:pPr lvl="1" eaLnBrk="1" latinLnBrk="0" hangingPunct="1"/>
+            <a:r>
+              <a:rPr kumimoji="0" lang="en-US" smtClean="0"/>
               <a:t>Second level</a:t>
             </a:r>
           </a:p>
           <a:p>
-            <a:pPr lvl="2"/>
-            <a:r>
-              <a:rPr lang="en-US" smtClean="0"/>
+            <a:pPr lvl="2" eaLnBrk="1" latinLnBrk="0" hangingPunct="1"/>
+            <a:r>
+              <a:rPr kumimoji="0" lang="en-US" smtClean="0"/>
               <a:t>Third level</a:t>
             </a:r>
           </a:p>
           <a:p>
-            <a:pPr lvl="3"/>
-            <a:r>
-              <a:rPr lang="en-US" smtClean="0"/>
+            <a:pPr lvl="3" eaLnBrk="1" latinLnBrk="0" hangingPunct="1"/>
+            <a:r>
+              <a:rPr kumimoji="0" lang="en-US" smtClean="0"/>
               <a:t>Fourth level</a:t>
             </a:r>
           </a:p>
           <a:p>
-            <a:pPr lvl="4"/>
-            <a:r>
-              <a:rPr lang="en-US" smtClean="0"/>
+            <a:pPr lvl="4" eaLnBrk="1" latinLnBrk="0" hangingPunct="1"/>
+            <a:r>
+              <a:rPr kumimoji="0" lang="en-US" smtClean="0"/>
               <a:t>Fifth level</a:t>
             </a:r>
-            <a:endParaRPr lang="en-US"/>
-          </a:p>
-        </p:txBody>
-      </p:sp>
-      <p:sp>
-        <p:nvSpPr>
-          <p:cNvPr id="4" name="Date Placeholder 3"/>
+            <a:endParaRPr kumimoji="0" lang="en-US"/>
+          </a:p>
+        </p:txBody>
+      </p:sp>
+      <p:sp>
+        <p:nvSpPr>
+          <p:cNvPr id="14" name="Date Placeholder 13"/>
           <p:cNvSpPr>
             <a:spLocks noGrp="1"/>
           </p:cNvSpPr>
@@ -2545,21 +2594,21 @@
         </p:nvSpPr>
         <p:spPr>
           <a:xfrm>
-            <a:off x="838200" y="6356350"/>
-            <a:ext cx="2743200" cy="365125"/>
+            <a:off x="609600" y="6416676"/>
+            <a:ext cx="2844800" cy="365125"/>
           </a:xfrm>
           <a:prstGeom prst="rect">
             <a:avLst/>
           </a:prstGeom>
         </p:spPr>
         <p:txBody>
-          <a:bodyPr vert="horz" lIns="91440" tIns="45720" rIns="91440" bIns="45720" rtlCol="0" anchor="ctr"/>
+          <a:bodyPr vert="horz" anchor="b"/>
           <a:lstStyle>
-            <a:lvl1pPr algn="l">
-              <a:defRPr sz="1200">
+            <a:lvl1pPr algn="l" eaLnBrk="1" latinLnBrk="0" hangingPunct="1">
+              <a:defRPr kumimoji="0" sz="1200">
                 <a:solidFill>
                   <a:schemeClr val="tx1">
-                    <a:tint val="75000"/>
+                    <a:shade val="50000"/>
                   </a:schemeClr>
                 </a:solidFill>
               </a:defRPr>
@@ -2568,7 +2617,7 @@
           <a:p>
             <a:fld id="{64F4A515-AF31-469B-9337-896FE1DBE917}" type="datetimeFigureOut">
               <a:rPr lang="en-US" smtClean="0"/>
-              <a:t>4/20/2013</a:t>
+              <a:t>4/21/2013</a:t>
             </a:fld>
             <a:endParaRPr lang="en-US"/>
           </a:p>
@@ -2576,7 +2625,7 @@
       </p:sp>
       <p:sp>
         <p:nvSpPr>
-          <p:cNvPr id="5" name="Footer Placeholder 4"/>
+          <p:cNvPr id="3" name="Footer Placeholder 2"/>
           <p:cNvSpPr>
             <a:spLocks noGrp="1"/>
           </p:cNvSpPr>
@@ -2586,21 +2635,21 @@
         </p:nvSpPr>
         <p:spPr>
           <a:xfrm>
-            <a:off x="4038600" y="6356350"/>
-            <a:ext cx="4114800" cy="365125"/>
+            <a:off x="4165600" y="6416676"/>
+            <a:ext cx="3860800" cy="365125"/>
           </a:xfrm>
           <a:prstGeom prst="rect">
             <a:avLst/>
           </a:prstGeom>
         </p:spPr>
         <p:txBody>
-          <a:bodyPr vert="horz" lIns="91440" tIns="45720" rIns="91440" bIns="45720" rtlCol="0" anchor="ctr"/>
+          <a:bodyPr vert="horz" anchor="b"/>
           <a:lstStyle>
-            <a:lvl1pPr algn="ctr">
-              <a:defRPr sz="1200">
+            <a:lvl1pPr algn="ctr" eaLnBrk="1" latinLnBrk="0" hangingPunct="1">
+              <a:defRPr kumimoji="0" sz="1200">
                 <a:solidFill>
                   <a:schemeClr val="tx1">
-                    <a:tint val="75000"/>
+                    <a:shade val="50000"/>
                   </a:schemeClr>
                 </a:solidFill>
               </a:defRPr>
@@ -2613,7 +2662,7 @@
       </p:sp>
       <p:sp>
         <p:nvSpPr>
-          <p:cNvPr id="6" name="Slide Number Placeholder 5"/>
+          <p:cNvPr id="23" name="Slide Number Placeholder 22"/>
           <p:cNvSpPr>
             <a:spLocks noGrp="1"/>
           </p:cNvSpPr>
@@ -2623,21 +2672,21 @@
         </p:nvSpPr>
         <p:spPr>
           <a:xfrm>
-            <a:off x="8610600" y="6356350"/>
-            <a:ext cx="2743200" cy="365125"/>
+            <a:off x="10566400" y="6416676"/>
+            <a:ext cx="1016000" cy="365125"/>
           </a:xfrm>
           <a:prstGeom prst="rect">
             <a:avLst/>
           </a:prstGeom>
         </p:spPr>
         <p:txBody>
-          <a:bodyPr vert="horz" lIns="91440" tIns="45720" rIns="91440" bIns="45720" rtlCol="0" anchor="ctr"/>
+          <a:bodyPr vert="horz" lIns="0" rIns="0" anchor="b"/>
           <a:lstStyle>
-            <a:lvl1pPr algn="r">
-              <a:defRPr sz="1200">
+            <a:lvl1pPr algn="r" eaLnBrk="1" latinLnBrk="0" hangingPunct="1">
+              <a:defRPr kumimoji="0" sz="1200">
                 <a:solidFill>
                   <a:schemeClr val="tx1">
-                    <a:tint val="75000"/>
+                    <a:shade val="50000"/>
                   </a:schemeClr>
                 </a:solidFill>
               </a:defRPr>
@@ -2653,40 +2702,62 @@
         </p:txBody>
       </p:sp>
     </p:spTree>
-    <p:extLst>
-      <p:ext uri="{BB962C8B-B14F-4D97-AF65-F5344CB8AC3E}">
-        <p14:creationId xmlns:p14="http://schemas.microsoft.com/office/powerpoint/2010/main" val="2062056968"/>
-      </p:ext>
-    </p:extLst>
   </p:cSld>
-  <p:clrMap bg1="lt1" tx1="dk1" bg2="lt2" tx2="dk2" accent1="accent1" accent2="accent2" accent3="accent3" accent4="accent4" accent5="accent5" accent6="accent6" hlink="hlink" folHlink="folHlink"/>
+  <p:clrMap bg1="dk1" tx1="lt1" bg2="dk2" tx2="lt2" accent1="accent1" accent2="accent2" accent3="accent3" accent4="accent4" accent5="accent5" accent6="accent6" hlink="hlink" folHlink="folHlink"/>
   <p:sldLayoutIdLst>
-    <p:sldLayoutId id="2147483649" r:id="rId1"/>
-    <p:sldLayoutId id="2147483650" r:id="rId2"/>
-    <p:sldLayoutId id="2147483651" r:id="rId3"/>
-    <p:sldLayoutId id="2147483652" r:id="rId4"/>
-    <p:sldLayoutId id="2147483653" r:id="rId5"/>
-    <p:sldLayoutId id="2147483654" r:id="rId6"/>
-    <p:sldLayoutId id="2147483655" r:id="rId7"/>
-    <p:sldLayoutId id="2147483656" r:id="rId8"/>
-    <p:sldLayoutId id="2147483657" r:id="rId9"/>
-    <p:sldLayoutId id="2147483658" r:id="rId10"/>
-    <p:sldLayoutId id="2147483659" r:id="rId11"/>
+    <p:sldLayoutId id="2147483661" r:id="rId1"/>
+    <p:sldLayoutId id="2147483662" r:id="rId2"/>
+    <p:sldLayoutId id="2147483663" r:id="rId3"/>
+    <p:sldLayoutId id="2147483664" r:id="rId4"/>
+    <p:sldLayoutId id="2147483665" r:id="rId5"/>
+    <p:sldLayoutId id="2147483666" r:id="rId6"/>
+    <p:sldLayoutId id="2147483667" r:id="rId7"/>
+    <p:sldLayoutId id="2147483668" r:id="rId8"/>
+    <p:sldLayoutId id="2147483669" r:id="rId9"/>
+    <p:sldLayoutId id="2147483670" r:id="rId10"/>
+    <p:sldLayoutId id="2147483671" r:id="rId11"/>
   </p:sldLayoutIdLst>
   <p:txStyles>
     <p:titleStyle>
-      <a:lvl1pPr algn="l" defTabSz="914400" rtl="0" eaLnBrk="1" latinLnBrk="0" hangingPunct="1">
-        <a:lnSpc>
-          <a:spcPct val="90000"/>
-        </a:lnSpc>
+      <a:lvl1pPr algn="ctr" rtl="0" eaLnBrk="1" latinLnBrk="0" hangingPunct="1">
         <a:spcBef>
           <a:spcPct val="0"/>
         </a:spcBef>
         <a:buNone/>
-        <a:defRPr sz="4400" kern="1200">
-          <a:solidFill>
-            <a:schemeClr val="tx1"/>
-          </a:solidFill>
+        <a:defRPr kumimoji="0" sz="4100" b="1" kern="1200" cap="none" baseline="0">
+          <a:ln w="6350">
+            <a:noFill/>
+          </a:ln>
+          <a:gradFill>
+            <a:gsLst>
+              <a:gs pos="0">
+                <a:schemeClr val="accent1">
+                  <a:tint val="73000"/>
+                  <a:satMod val="145000"/>
+                </a:schemeClr>
+              </a:gs>
+              <a:gs pos="73000">
+                <a:schemeClr val="accent1">
+                  <a:tint val="73000"/>
+                  <a:satMod val="145000"/>
+                </a:schemeClr>
+              </a:gs>
+              <a:gs pos="100000">
+                <a:schemeClr val="accent1">
+                  <a:tint val="83000"/>
+                  <a:satMod val="143000"/>
+                </a:schemeClr>
+              </a:gs>
+            </a:gsLst>
+            <a:lin ang="4800000" scaled="1"/>
+          </a:gradFill>
+          <a:effectLst>
+            <a:outerShdw blurRad="114300" dist="101600" dir="2700000" algn="tl" rotWithShape="0">
+              <a:srgbClr val="000000">
+                <a:alpha val="40000"/>
+              </a:srgbClr>
+            </a:outerShdw>
+          </a:effectLst>
           <a:latin typeface="+mj-lt"/>
           <a:ea typeface="+mj-ea"/>
           <a:cs typeface="+mj-cs"/>
@@ -2694,16 +2765,19 @@
       </a:lvl1pPr>
     </p:titleStyle>
     <p:bodyStyle>
-      <a:lvl1pPr marL="228600" indent="-228600" algn="l" defTabSz="914400" rtl="0" eaLnBrk="1" latinLnBrk="0" hangingPunct="1">
-        <a:lnSpc>
-          <a:spcPct val="90000"/>
-        </a:lnSpc>
+      <a:lvl1pPr marL="548640" indent="-411480" algn="l" rtl="0" eaLnBrk="1" latinLnBrk="0" hangingPunct="1">
         <a:spcBef>
-          <a:spcPts val="1000"/>
+          <a:spcPct val="20000"/>
         </a:spcBef>
-        <a:buFont typeface="Arial" panose="020B0604020202020204" pitchFamily="34" charset="0"/>
-        <a:buChar char="•"/>
-        <a:defRPr sz="2800" kern="1200">
+        <a:buClr>
+          <a:schemeClr val="tx1">
+            <a:shade val="95000"/>
+          </a:schemeClr>
+        </a:buClr>
+        <a:buSzPct val="65000"/>
+        <a:buFont typeface="Wingdings 2"/>
+        <a:buChar char=""/>
+        <a:defRPr kumimoji="0" sz="2800" kern="1200">
           <a:solidFill>
             <a:schemeClr val="tx1"/>
           </a:solidFill>
@@ -2712,16 +2786,17 @@
           <a:cs typeface="+mn-cs"/>
         </a:defRPr>
       </a:lvl1pPr>
-      <a:lvl2pPr marL="685800" indent="-228600" algn="l" defTabSz="914400" rtl="0" eaLnBrk="1" latinLnBrk="0" hangingPunct="1">
-        <a:lnSpc>
-          <a:spcPct val="90000"/>
-        </a:lnSpc>
+      <a:lvl2pPr marL="868680" indent="-283464" algn="l" rtl="0" eaLnBrk="1" latinLnBrk="0" hangingPunct="1">
         <a:spcBef>
-          <a:spcPts val="500"/>
+          <a:spcPct val="20000"/>
         </a:spcBef>
-        <a:buFont typeface="Arial" panose="020B0604020202020204" pitchFamily="34" charset="0"/>
-        <a:buChar char="•"/>
-        <a:defRPr sz="2400" kern="1200">
+        <a:buClr>
+          <a:schemeClr val="tx1"/>
+        </a:buClr>
+        <a:buSzPct val="80000"/>
+        <a:buFont typeface="Wingdings 2"/>
+        <a:buChar char=""/>
+        <a:defRPr kumimoji="0" sz="2400" kern="1200">
           <a:solidFill>
             <a:schemeClr val="tx1"/>
           </a:solidFill>
@@ -2730,16 +2805,17 @@
           <a:cs typeface="+mn-cs"/>
         </a:defRPr>
       </a:lvl2pPr>
-      <a:lvl3pPr marL="1143000" indent="-228600" algn="l" defTabSz="914400" rtl="0" eaLnBrk="1" latinLnBrk="0" hangingPunct="1">
-        <a:lnSpc>
-          <a:spcPct val="90000"/>
-        </a:lnSpc>
+      <a:lvl3pPr marL="1133856" indent="-228600" algn="l" rtl="0" eaLnBrk="1" latinLnBrk="0" hangingPunct="1">
         <a:spcBef>
-          <a:spcPts val="500"/>
+          <a:spcPct val="20000"/>
         </a:spcBef>
-        <a:buFont typeface="Arial" panose="020B0604020202020204" pitchFamily="34" charset="0"/>
-        <a:buChar char="•"/>
-        <a:defRPr sz="2000" kern="1200">
+        <a:buClr>
+          <a:schemeClr val="tx1"/>
+        </a:buClr>
+        <a:buSzPct val="95000"/>
+        <a:buFont typeface="Wingdings"/>
+        <a:buChar char=""/>
+        <a:defRPr kumimoji="0" sz="2200" kern="1200">
           <a:solidFill>
             <a:schemeClr val="tx1"/>
           </a:solidFill>
@@ -2748,16 +2824,17 @@
           <a:cs typeface="+mn-cs"/>
         </a:defRPr>
       </a:lvl3pPr>
-      <a:lvl4pPr marL="1600200" indent="-228600" algn="l" defTabSz="914400" rtl="0" eaLnBrk="1" latinLnBrk="0" hangingPunct="1">
-        <a:lnSpc>
-          <a:spcPct val="90000"/>
-        </a:lnSpc>
+      <a:lvl4pPr marL="1353312" indent="-182880" algn="l" rtl="0" eaLnBrk="1" latinLnBrk="0" hangingPunct="1">
         <a:spcBef>
-          <a:spcPts val="500"/>
+          <a:spcPct val="20000"/>
         </a:spcBef>
-        <a:buFont typeface="Arial" panose="020B0604020202020204" pitchFamily="34" charset="0"/>
-        <a:buChar char="•"/>
-        <a:defRPr sz="1800" kern="1200">
+        <a:buClr>
+          <a:schemeClr val="tx1"/>
+        </a:buClr>
+        <a:buSzPct val="100000"/>
+        <a:buFont typeface="Wingdings 3"/>
+        <a:buChar char=""/>
+        <a:defRPr kumimoji="0" sz="2000" kern="1200">
           <a:solidFill>
             <a:schemeClr val="tx1"/>
           </a:solidFill>
@@ -2766,16 +2843,16 @@
           <a:cs typeface="+mn-cs"/>
         </a:defRPr>
       </a:lvl4pPr>
-      <a:lvl5pPr marL="2057400" indent="-228600" algn="l" defTabSz="914400" rtl="0" eaLnBrk="1" latinLnBrk="0" hangingPunct="1">
-        <a:lnSpc>
-          <a:spcPct val="90000"/>
-        </a:lnSpc>
+      <a:lvl5pPr marL="1545336" indent="-182880" algn="l" rtl="0" eaLnBrk="1" latinLnBrk="0" hangingPunct="1">
         <a:spcBef>
-          <a:spcPts val="500"/>
+          <a:spcPct val="20000"/>
         </a:spcBef>
-        <a:buFont typeface="Arial" panose="020B0604020202020204" pitchFamily="34" charset="0"/>
-        <a:buChar char="•"/>
-        <a:defRPr sz="1800" kern="1200">
+        <a:buClr>
+          <a:schemeClr val="tx1"/>
+        </a:buClr>
+        <a:buFont typeface="Wingdings 2"/>
+        <a:buChar char=""/>
+        <a:defRPr kumimoji="0" sz="2000" kern="1200">
           <a:solidFill>
             <a:schemeClr val="tx1"/>
           </a:solidFill>
@@ -2784,16 +2861,16 @@
           <a:cs typeface="+mn-cs"/>
         </a:defRPr>
       </a:lvl5pPr>
-      <a:lvl6pPr marL="2514600" indent="-228600" algn="l" defTabSz="914400" rtl="0" eaLnBrk="1" latinLnBrk="0" hangingPunct="1">
-        <a:lnSpc>
-          <a:spcPct val="90000"/>
-        </a:lnSpc>
+      <a:lvl6pPr marL="1764792" indent="-182880" algn="l" rtl="0" eaLnBrk="1" latinLnBrk="0" hangingPunct="1">
         <a:spcBef>
-          <a:spcPts val="500"/>
+          <a:spcPct val="20000"/>
         </a:spcBef>
-        <a:buFont typeface="Arial" panose="020B0604020202020204" pitchFamily="34" charset="0"/>
-        <a:buChar char="•"/>
-        <a:defRPr sz="1800" kern="1200">
+        <a:buClr>
+          <a:schemeClr val="tx1"/>
+        </a:buClr>
+        <a:buFont typeface="Wingdings 3"/>
+        <a:buChar char=""/>
+        <a:defRPr kumimoji="0" sz="1800" kern="1200">
           <a:solidFill>
             <a:schemeClr val="tx1"/>
           </a:solidFill>
@@ -2802,16 +2879,16 @@
           <a:cs typeface="+mn-cs"/>
         </a:defRPr>
       </a:lvl6pPr>
-      <a:lvl7pPr marL="2971800" indent="-228600" algn="l" defTabSz="914400" rtl="0" eaLnBrk="1" latinLnBrk="0" hangingPunct="1">
-        <a:lnSpc>
-          <a:spcPct val="90000"/>
-        </a:lnSpc>
+      <a:lvl7pPr marL="1965960" indent="-182880" algn="l" rtl="0" eaLnBrk="1" latinLnBrk="0" hangingPunct="1">
         <a:spcBef>
-          <a:spcPts val="500"/>
+          <a:spcPct val="20000"/>
         </a:spcBef>
-        <a:buFont typeface="Arial" panose="020B0604020202020204" pitchFamily="34" charset="0"/>
-        <a:buChar char="•"/>
-        <a:defRPr sz="1800" kern="1200">
+        <a:buClr>
+          <a:schemeClr val="tx1"/>
+        </a:buClr>
+        <a:buFont typeface="Wingdings 2"/>
+        <a:buChar char=""/>
+        <a:defRPr kumimoji="0" sz="1600" kern="1200">
           <a:solidFill>
             <a:schemeClr val="tx1"/>
           </a:solidFill>
@@ -2820,16 +2897,16 @@
           <a:cs typeface="+mn-cs"/>
         </a:defRPr>
       </a:lvl7pPr>
-      <a:lvl8pPr marL="3429000" indent="-228600" algn="l" defTabSz="914400" rtl="0" eaLnBrk="1" latinLnBrk="0" hangingPunct="1">
-        <a:lnSpc>
-          <a:spcPct val="90000"/>
-        </a:lnSpc>
+      <a:lvl8pPr marL="2167128" indent="-182880" algn="l" rtl="0" eaLnBrk="1" latinLnBrk="0" hangingPunct="1">
         <a:spcBef>
-          <a:spcPts val="500"/>
+          <a:spcPct val="20000"/>
         </a:spcBef>
-        <a:buFont typeface="Arial" panose="020B0604020202020204" pitchFamily="34" charset="0"/>
-        <a:buChar char="•"/>
-        <a:defRPr sz="1800" kern="1200">
+        <a:buClr>
+          <a:schemeClr val="tx1"/>
+        </a:buClr>
+        <a:buFont typeface="Wingdings 2"/>
+        <a:buChar char=""/>
+        <a:defRPr kumimoji="0" sz="1400" kern="1200">
           <a:solidFill>
             <a:schemeClr val="tx1"/>
           </a:solidFill>
@@ -2838,16 +2915,16 @@
           <a:cs typeface="+mn-cs"/>
         </a:defRPr>
       </a:lvl8pPr>
-      <a:lvl9pPr marL="3886200" indent="-228600" algn="l" defTabSz="914400" rtl="0" eaLnBrk="1" latinLnBrk="0" hangingPunct="1">
-        <a:lnSpc>
-          <a:spcPct val="90000"/>
-        </a:lnSpc>
+      <a:lvl9pPr marL="2368296" indent="-182880" algn="l" rtl="0" eaLnBrk="1" latinLnBrk="0" hangingPunct="1">
         <a:spcBef>
-          <a:spcPts val="500"/>
+          <a:spcPct val="20000"/>
         </a:spcBef>
-        <a:buFont typeface="Arial" panose="020B0604020202020204" pitchFamily="34" charset="0"/>
-        <a:buChar char="•"/>
-        <a:defRPr sz="1800" kern="1200">
+        <a:buClr>
+          <a:schemeClr val="tx1"/>
+        </a:buClr>
+        <a:buFont typeface="Wingdings 2"/>
+        <a:buChar char=""/>
+        <a:defRPr kumimoji="0" sz="1400" kern="1200" baseline="0">
           <a:solidFill>
             <a:schemeClr val="tx1"/>
           </a:solidFill>
@@ -2858,11 +2935,8 @@
       </a:lvl9pPr>
     </p:bodyStyle>
     <p:otherStyle>
-      <a:defPPr>
-        <a:defRPr lang="en-US"/>
-      </a:defPPr>
-      <a:lvl1pPr marL="0" algn="l" defTabSz="914400" rtl="0" eaLnBrk="1" latinLnBrk="0" hangingPunct="1">
-        <a:defRPr sz="1800" kern="1200">
+      <a:lvl1pPr marL="0" algn="l" rtl="0" eaLnBrk="1" latinLnBrk="0" hangingPunct="1">
+        <a:defRPr kumimoji="0" kern="1200">
           <a:solidFill>
             <a:schemeClr val="tx1"/>
           </a:solidFill>
@@ -2871,8 +2945,8 @@
           <a:cs typeface="+mn-cs"/>
         </a:defRPr>
       </a:lvl1pPr>
-      <a:lvl2pPr marL="457200" algn="l" defTabSz="914400" rtl="0" eaLnBrk="1" latinLnBrk="0" hangingPunct="1">
-        <a:defRPr sz="1800" kern="1200">
+      <a:lvl2pPr marL="457200" algn="l" rtl="0" eaLnBrk="1" latinLnBrk="0" hangingPunct="1">
+        <a:defRPr kumimoji="0" kern="1200">
           <a:solidFill>
             <a:schemeClr val="tx1"/>
           </a:solidFill>
@@ -2881,8 +2955,8 @@
           <a:cs typeface="+mn-cs"/>
         </a:defRPr>
       </a:lvl2pPr>
-      <a:lvl3pPr marL="914400" algn="l" defTabSz="914400" rtl="0" eaLnBrk="1" latinLnBrk="0" hangingPunct="1">
-        <a:defRPr sz="1800" kern="1200">
+      <a:lvl3pPr marL="914400" algn="l" rtl="0" eaLnBrk="1" latinLnBrk="0" hangingPunct="1">
+        <a:defRPr kumimoji="0" kern="1200">
           <a:solidFill>
             <a:schemeClr val="tx1"/>
           </a:solidFill>
@@ -2891,8 +2965,8 @@
           <a:cs typeface="+mn-cs"/>
         </a:defRPr>
       </a:lvl3pPr>
-      <a:lvl4pPr marL="1371600" algn="l" defTabSz="914400" rtl="0" eaLnBrk="1" latinLnBrk="0" hangingPunct="1">
-        <a:defRPr sz="1800" kern="1200">
+      <a:lvl4pPr marL="1371600" algn="l" rtl="0" eaLnBrk="1" latinLnBrk="0" hangingPunct="1">
+        <a:defRPr kumimoji="0" kern="1200">
           <a:solidFill>
             <a:schemeClr val="tx1"/>
           </a:solidFill>
@@ -2901,8 +2975,8 @@
           <a:cs typeface="+mn-cs"/>
         </a:defRPr>
       </a:lvl4pPr>
-      <a:lvl5pPr marL="1828800" algn="l" defTabSz="914400" rtl="0" eaLnBrk="1" latinLnBrk="0" hangingPunct="1">
-        <a:defRPr sz="1800" kern="1200">
+      <a:lvl5pPr marL="1828800" algn="l" rtl="0" eaLnBrk="1" latinLnBrk="0" hangingPunct="1">
+        <a:defRPr kumimoji="0" kern="1200">
           <a:solidFill>
             <a:schemeClr val="tx1"/>
           </a:solidFill>
@@ -2911,8 +2985,8 @@
           <a:cs typeface="+mn-cs"/>
         </a:defRPr>
       </a:lvl5pPr>
-      <a:lvl6pPr marL="2286000" algn="l" defTabSz="914400" rtl="0" eaLnBrk="1" latinLnBrk="0" hangingPunct="1">
-        <a:defRPr sz="1800" kern="1200">
+      <a:lvl6pPr marL="2286000" algn="l" rtl="0" eaLnBrk="1" latinLnBrk="0" hangingPunct="1">
+        <a:defRPr kumimoji="0" kern="1200">
           <a:solidFill>
             <a:schemeClr val="tx1"/>
           </a:solidFill>
@@ -2921,8 +2995,8 @@
           <a:cs typeface="+mn-cs"/>
         </a:defRPr>
       </a:lvl6pPr>
-      <a:lvl7pPr marL="2743200" algn="l" defTabSz="914400" rtl="0" eaLnBrk="1" latinLnBrk="0" hangingPunct="1">
-        <a:defRPr sz="1800" kern="1200">
+      <a:lvl7pPr marL="2743200" algn="l" rtl="0" eaLnBrk="1" latinLnBrk="0" hangingPunct="1">
+        <a:defRPr kumimoji="0" kern="1200">
           <a:solidFill>
             <a:schemeClr val="tx1"/>
           </a:solidFill>
@@ -2931,8 +3005,8 @@
           <a:cs typeface="+mn-cs"/>
         </a:defRPr>
       </a:lvl7pPr>
-      <a:lvl8pPr marL="3200400" algn="l" defTabSz="914400" rtl="0" eaLnBrk="1" latinLnBrk="0" hangingPunct="1">
-        <a:defRPr sz="1800" kern="1200">
+      <a:lvl8pPr marL="3200400" algn="l" rtl="0" eaLnBrk="1" latinLnBrk="0" hangingPunct="1">
+        <a:defRPr kumimoji="0" kern="1200">
           <a:solidFill>
             <a:schemeClr val="tx1"/>
           </a:solidFill>
@@ -2941,8 +3015,8 @@
           <a:cs typeface="+mn-cs"/>
         </a:defRPr>
       </a:lvl8pPr>
-      <a:lvl9pPr marL="3657600" algn="l" defTabSz="914400" rtl="0" eaLnBrk="1" latinLnBrk="0" hangingPunct="1">
-        <a:defRPr sz="1800" kern="1200">
+      <a:lvl9pPr marL="3657600" algn="l" rtl="0" eaLnBrk="1" latinLnBrk="0" hangingPunct="1">
+        <a:defRPr kumimoji="0" kern="1200">
           <a:solidFill>
             <a:schemeClr val="tx1"/>
           </a:solidFill>
@@ -3019,7 +3093,7 @@
         </p:spPr>
         <p:txBody>
           <a:bodyPr>
-            <a:normAutofit fontScale="92500" lnSpcReduction="20000"/>
+            <a:normAutofit fontScale="85000" lnSpcReduction="20000"/>
           </a:bodyPr>
           <a:lstStyle/>
           <a:p>
@@ -3146,13 +3220,19 @@
           <a:p>
             <a:r>
               <a:rPr lang="en-US" dirty="0" smtClean="0"/>
-              <a:t>Have a better idea of what needs to happen </a:t>
-            </a:r>
-            <a:r>
-              <a:rPr lang="en-US" smtClean="0"/>
-              <a:t>in terms of code</a:t>
-            </a:r>
-            <a:endParaRPr lang="en-US"/>
+              <a:t>Have a better idea of what needs to happen in terms of </a:t>
+            </a:r>
+            <a:r>
+              <a:rPr lang="en-US" dirty="0" smtClean="0"/>
+              <a:t>code</a:t>
+            </a:r>
+          </a:p>
+          <a:p>
+            <a:r>
+              <a:rPr lang="en-US" dirty="0" smtClean="0"/>
+              <a:t>Tools that are available to use</a:t>
+            </a:r>
+            <a:endParaRPr lang="en-US" dirty="0"/>
           </a:p>
         </p:txBody>
       </p:sp>
@@ -3222,7 +3302,7 @@
         <p:spPr/>
         <p:txBody>
           <a:bodyPr>
-            <a:normAutofit lnSpcReduction="10000"/>
+            <a:normAutofit/>
           </a:bodyPr>
           <a:lstStyle/>
           <a:p>
@@ -3363,7 +3443,7 @@
         <p:spPr/>
         <p:txBody>
           <a:bodyPr>
-            <a:normAutofit fontScale="92500"/>
+            <a:normAutofit fontScale="92500" lnSpcReduction="10000"/>
           </a:bodyPr>
           <a:lstStyle/>
           <a:p>
@@ -3792,7 +3872,48 @@
           <a:bodyPr/>
           <a:lstStyle/>
           <a:p>
-            <a:endParaRPr lang="en-US"/>
+            <a:r>
+              <a:rPr lang="en-US" dirty="0" smtClean="0"/>
+              <a:t>4337 source lines of code</a:t>
+            </a:r>
+          </a:p>
+          <a:p>
+            <a:r>
+              <a:rPr lang="en-US" dirty="0" smtClean="0"/>
+              <a:t>210 team hours total</a:t>
+            </a:r>
+          </a:p>
+          <a:p>
+            <a:pPr lvl="1"/>
+            <a:r>
+              <a:rPr lang="en-US" dirty="0" smtClean="0"/>
+              <a:t>100 Cycle 2</a:t>
+            </a:r>
+          </a:p>
+          <a:p>
+            <a:pPr lvl="1"/>
+            <a:r>
+              <a:rPr lang="en-US" dirty="0" smtClean="0"/>
+              <a:t>110 Cycle 1</a:t>
+            </a:r>
+          </a:p>
+          <a:p>
+            <a:r>
+              <a:rPr lang="en-US" dirty="0" smtClean="0"/>
+              <a:t>100 defects</a:t>
+            </a:r>
+          </a:p>
+          <a:p>
+            <a:pPr lvl="1"/>
+            <a:r>
+              <a:rPr lang="en-US" dirty="0" smtClean="0"/>
+              <a:t>Roughly 50% </a:t>
+            </a:r>
+            <a:r>
+              <a:rPr lang="en-US" smtClean="0"/>
+              <a:t>came during coding</a:t>
+            </a:r>
+            <a:endParaRPr lang="en-US" dirty="0"/>
           </a:p>
         </p:txBody>
       </p:sp>
@@ -3967,9 +4088,9 @@
 </file>
 
 <file path=ppt/theme/theme1.xml><?xml version="1.0" encoding="utf-8"?>
-<a:theme xmlns:a="http://schemas.openxmlformats.org/drawingml/2006/main" name="Office Theme">
+<a:theme xmlns:a="http://schemas.openxmlformats.org/drawingml/2006/main" name="Apex">
   <a:themeElements>
-    <a:clrScheme name="Office">
+    <a:clrScheme name="Apex">
       <a:dk1>
         <a:sysClr val="windowText" lastClr="000000"/>
       </a:dk1>
@@ -3977,48 +4098,87 @@
         <a:sysClr val="window" lastClr="FFFFFF"/>
       </a:lt1>
       <a:dk2>
-        <a:srgbClr val="44546A"/>
+        <a:srgbClr val="69676D"/>
       </a:dk2>
       <a:lt2>
-        <a:srgbClr val="E7E6E6"/>
+        <a:srgbClr val="C9C2D1"/>
       </a:lt2>
       <a:accent1>
-        <a:srgbClr val="5B9BD5"/>
+        <a:srgbClr val="CEB966"/>
       </a:accent1>
       <a:accent2>
-        <a:srgbClr val="ED7D31"/>
+        <a:srgbClr val="9CB084"/>
       </a:accent2>
       <a:accent3>
-        <a:srgbClr val="A5A5A5"/>
+        <a:srgbClr val="6BB1C9"/>
       </a:accent3>
       <a:accent4>
-        <a:srgbClr val="FFC000"/>
+        <a:srgbClr val="6585CF"/>
       </a:accent4>
       <a:accent5>
-        <a:srgbClr val="4472C4"/>
+        <a:srgbClr val="7E6BC9"/>
       </a:accent5>
       <a:accent6>
-        <a:srgbClr val="70AD47"/>
+        <a:srgbClr val="A379BB"/>
       </a:accent6>
       <a:hlink>
-        <a:srgbClr val="0563C1"/>
+        <a:srgbClr val="410082"/>
       </a:hlink>
       <a:folHlink>
-        <a:srgbClr val="954F72"/>
+        <a:srgbClr val="932968"/>
       </a:folHlink>
     </a:clrScheme>
-    <a:fontScheme name="Office">
+    <a:fontScheme name="Apex">
       <a:majorFont>
-        <a:latin typeface="Calibri Light" panose="020F0302020204030204"/>
+        <a:latin typeface="Lucida Sans"/>
         <a:ea typeface=""/>
         <a:cs typeface=""/>
-        <a:font script="Jpan" typeface="ＭＳ Ｐゴシック"/>
-        <a:font script="Hang" typeface="맑은 고딕"/>
+        <a:font script="Grek" typeface="Arial"/>
+        <a:font script="Cyrl" typeface="Arial"/>
+        <a:font script="Jpan" typeface="HG丸ｺﾞｼｯｸM-PRO"/>
+        <a:font script="Hang" typeface="휴먼옛체"/>
+        <a:font script="Hans" typeface="黑体"/>
+        <a:font script="Hant" typeface="微軟正黑體"/>
+        <a:font script="Arab" typeface="Tahoma"/>
+        <a:font script="Hebr" typeface="Levenim MT"/>
+        <a:font script="Thai" typeface="FreesiaUPC"/>
+        <a:font script="Ethi" typeface="Nyala"/>
+        <a:font script="Beng" typeface="Vrinda"/>
+        <a:font script="Gujr" typeface="Shruti"/>
+        <a:font script="Khmr" typeface="DaunPenh"/>
+        <a:font script="Knda" typeface="Tunga"/>
+        <a:font script="Guru" typeface="Raavi"/>
+        <a:font script="Cans" typeface="Euphemia"/>
+        <a:font script="Cher" typeface="Plantagenet Cherokee"/>
+        <a:font script="Yiii" typeface="Microsoft Yi Baiti"/>
+        <a:font script="Tibt" typeface="Microsoft Himalaya"/>
+        <a:font script="Thaa" typeface="MV Boli"/>
+        <a:font script="Deva" typeface="Mangal"/>
+        <a:font script="Telu" typeface="Gautami"/>
+        <a:font script="Taml" typeface="Latha"/>
+        <a:font script="Syrc" typeface="Estrangelo Edessa"/>
+        <a:font script="Orya" typeface="Kalinga"/>
+        <a:font script="Mlym" typeface="Kartika"/>
+        <a:font script="Laoo" typeface="DokChampa"/>
+        <a:font script="Sinh" typeface="Iskoola Pota"/>
+        <a:font script="Mong" typeface="Mongolian Baiti"/>
+        <a:font script="Viet" typeface="Tahoma"/>
+        <a:font script="Uigh" typeface="Microsoft Uighur"/>
+        <a:font script="Geor" typeface="Sylfaen"/>
+      </a:majorFont>
+      <a:minorFont>
+        <a:latin typeface="Book Antiqua"/>
+        <a:ea typeface=""/>
+        <a:cs typeface=""/>
+        <a:font script="Grek" typeface="Times New Roman"/>
+        <a:font script="Cyrl" typeface="Times New Roman"/>
+        <a:font script="Jpan" typeface="HG明朝B"/>
+        <a:font script="Hang" typeface="돋움"/>
         <a:font script="Hans" typeface="宋体"/>
         <a:font script="Hant" typeface="新細明體"/>
         <a:font script="Arab" typeface="Times New Roman"/>
-        <a:font script="Hebr" typeface="Times New Roman"/>
-        <a:font script="Thai" typeface="Angsana New"/>
+        <a:font script="Hebr" typeface="David"/>
+        <a:font script="Thai" typeface="EucrosiaUPC"/>
         <a:font script="Ethi" typeface="Nyala"/>
         <a:font script="Beng" typeface="Vrinda"/>
         <a:font script="Gujr" typeface="Shruti"/>
@@ -4042,45 +4202,133 @@
         <a:font script="Viet" typeface="Times New Roman"/>
         <a:font script="Uigh" typeface="Microsoft Uighur"/>
         <a:font script="Geor" typeface="Sylfaen"/>
-      </a:majorFont>
-      <a:minorFont>
-        <a:latin typeface="Calibri" panose="020F0502020204030204"/>
-        <a:ea typeface=""/>
-        <a:cs typeface=""/>
-        <a:font script="Jpan" typeface="ＭＳ Ｐゴシック"/>
-        <a:font script="Hang" typeface="맑은 고딕"/>
-        <a:font script="Hans" typeface="宋体"/>
-        <a:font script="Hant" typeface="新細明體"/>
-        <a:font script="Arab" typeface="Arial"/>
-        <a:font script="Hebr" typeface="Arial"/>
-        <a:font script="Thai" typeface="Cordia New"/>
-        <a:font script="Ethi" typeface="Nyala"/>
-        <a:font script="Beng" typeface="Vrinda"/>
-        <a:font script="Gujr" typeface="Shruti"/>
-        <a:font script="Khmr" typeface="DaunPenh"/>
-        <a:font script="Knda" typeface="Tunga"/>
-        <a:font script="Guru" typeface="Raavi"/>
-        <a:font script="Cans" typeface="Euphemia"/>
-        <a:font script="Cher" typeface="Plantagenet Cherokee"/>
-        <a:font script="Yiii" typeface="Microsoft Yi Baiti"/>
-        <a:font script="Tibt" typeface="Microsoft Himalaya"/>
-        <a:font script="Thaa" typeface="MV Boli"/>
-        <a:font script="Deva" typeface="Mangal"/>
-        <a:font script="Telu" typeface="Gautami"/>
-        <a:font script="Taml" typeface="Latha"/>
-        <a:font script="Syrc" typeface="Estrangelo Edessa"/>
-        <a:font script="Orya" typeface="Kalinga"/>
-        <a:font script="Mlym" typeface="Kartika"/>
-        <a:font script="Laoo" typeface="DokChampa"/>
-        <a:font script="Sinh" typeface="Iskoola Pota"/>
-        <a:font script="Mong" typeface="Mongolian Baiti"/>
-        <a:font script="Viet" typeface="Arial"/>
-        <a:font script="Uigh" typeface="Microsoft Uighur"/>
-        <a:font script="Geor" typeface="Sylfaen"/>
       </a:minorFont>
     </a:fontScheme>
-    <a:fmtScheme name="Office">
+    <a:fmtScheme name="Apex">
       <a:fillStyleLst>
+        <a:solidFill>
+          <a:schemeClr val="phClr"/>
+        </a:solidFill>
+        <a:gradFill rotWithShape="1">
+          <a:gsLst>
+            <a:gs pos="20000">
+              <a:schemeClr val="phClr">
+                <a:tint val="9000"/>
+              </a:schemeClr>
+            </a:gs>
+            <a:gs pos="100000">
+              <a:schemeClr val="phClr">
+                <a:tint val="70000"/>
+                <a:satMod val="100000"/>
+              </a:schemeClr>
+            </a:gs>
+          </a:gsLst>
+          <a:path path="circle">
+            <a:fillToRect l="-15000" t="-15000" r="115000" b="115000"/>
+          </a:path>
+        </a:gradFill>
+        <a:gradFill rotWithShape="1">
+          <a:gsLst>
+            <a:gs pos="0">
+              <a:schemeClr val="phClr">
+                <a:shade val="60000"/>
+              </a:schemeClr>
+            </a:gs>
+            <a:gs pos="33000">
+              <a:schemeClr val="phClr">
+                <a:tint val="86500"/>
+              </a:schemeClr>
+            </a:gs>
+            <a:gs pos="46750">
+              <a:schemeClr val="phClr">
+                <a:tint val="71000"/>
+                <a:satMod val="112000"/>
+              </a:schemeClr>
+            </a:gs>
+            <a:gs pos="53000">
+              <a:schemeClr val="phClr">
+                <a:tint val="71000"/>
+                <a:satMod val="112000"/>
+              </a:schemeClr>
+            </a:gs>
+            <a:gs pos="68000">
+              <a:schemeClr val="phClr">
+                <a:tint val="86000"/>
+              </a:schemeClr>
+            </a:gs>
+            <a:gs pos="100000">
+              <a:schemeClr val="phClr">
+                <a:shade val="60000"/>
+              </a:schemeClr>
+            </a:gs>
+          </a:gsLst>
+          <a:lin ang="8350000" scaled="1"/>
+        </a:gradFill>
+      </a:fillStyleLst>
+      <a:lnStyleLst>
+        <a:ln w="9525" cap="flat" cmpd="sng" algn="ctr">
+          <a:solidFill>
+            <a:schemeClr val="phClr">
+              <a:shade val="48000"/>
+              <a:satMod val="110000"/>
+            </a:schemeClr>
+          </a:solidFill>
+          <a:prstDash val="solid"/>
+        </a:ln>
+        <a:ln w="25400" cap="flat" cmpd="sng" algn="ctr">
+          <a:solidFill>
+            <a:schemeClr val="phClr"/>
+          </a:solidFill>
+          <a:prstDash val="solid"/>
+        </a:ln>
+        <a:ln w="38100" cap="flat" cmpd="sng" algn="ctr">
+          <a:solidFill>
+            <a:schemeClr val="phClr"/>
+          </a:solidFill>
+          <a:prstDash val="solid"/>
+        </a:ln>
+      </a:lnStyleLst>
+      <a:effectStyleLst>
+        <a:effectStyle>
+          <a:effectLst>
+            <a:outerShdw blurRad="130000" dist="101600" dir="2700000" algn="tl" rotWithShape="0">
+              <a:srgbClr val="000000">
+                <a:alpha val="35000"/>
+              </a:srgbClr>
+            </a:outerShdw>
+          </a:effectLst>
+        </a:effectStyle>
+        <a:effectStyle>
+          <a:effectLst>
+            <a:outerShdw blurRad="190500" dist="228600" dir="2700000" sy="90000" rotWithShape="0">
+              <a:srgbClr val="000000">
+                <a:alpha val="25500"/>
+              </a:srgbClr>
+            </a:outerShdw>
+          </a:effectLst>
+        </a:effectStyle>
+        <a:effectStyle>
+          <a:effectLst>
+            <a:outerShdw blurRad="190500" dist="228600" dir="2700000" sy="90000" rotWithShape="0">
+              <a:srgbClr val="000000">
+                <a:alpha val="25500"/>
+              </a:srgbClr>
+            </a:outerShdw>
+          </a:effectLst>
+          <a:scene3d>
+            <a:camera prst="orthographicFront" fov="0">
+              <a:rot lat="0" lon="0" rev="0"/>
+            </a:camera>
+            <a:lightRig rig="soft" dir="tl">
+              <a:rot lat="0" lon="0" rev="20100000"/>
+            </a:lightRig>
+          </a:scene3d>
+          <a:sp3d>
+            <a:bevelT w="50800" h="50800"/>
+          </a:sp3d>
+        </a:effectStyle>
+      </a:effectStyleLst>
+      <a:bgFillStyleLst>
         <a:solidFill>
           <a:schemeClr val="phClr"/>
         </a:solidFill>
@@ -4088,141 +4336,42 @@
           <a:gsLst>
             <a:gs pos="0">
               <a:schemeClr val="phClr">
-                <a:lumMod val="110000"/>
-                <a:satMod val="105000"/>
-                <a:tint val="67000"/>
-              </a:schemeClr>
-            </a:gs>
-            <a:gs pos="50000">
-              <a:schemeClr val="phClr">
-                <a:lumMod val="105000"/>
-                <a:satMod val="103000"/>
-                <a:tint val="73000"/>
+                <a:tint val="50000"/>
+                <a:satMod val="180000"/>
               </a:schemeClr>
             </a:gs>
             <a:gs pos="100000">
               <a:schemeClr val="phClr">
-                <a:lumMod val="105000"/>
-                <a:satMod val="109000"/>
-                <a:tint val="81000"/>
-              </a:schemeClr>
-            </a:gs>
-          </a:gsLst>
-          <a:lin ang="5400000" scaled="0"/>
-        </a:gradFill>
-        <a:gradFill rotWithShape="1">
-          <a:gsLst>
-            <a:gs pos="0">
-              <a:schemeClr val="phClr">
-                <a:satMod val="103000"/>
-                <a:lumMod val="102000"/>
-                <a:tint val="94000"/>
-              </a:schemeClr>
-            </a:gs>
-            <a:gs pos="50000">
-              <a:schemeClr val="phClr">
-                <a:satMod val="110000"/>
-                <a:lumMod val="100000"/>
-                <a:shade val="100000"/>
-              </a:schemeClr>
-            </a:gs>
-            <a:gs pos="100000">
-              <a:schemeClr val="phClr">
-                <a:lumMod val="99000"/>
-                <a:satMod val="120000"/>
-                <a:shade val="78000"/>
-              </a:schemeClr>
-            </a:gs>
-          </a:gsLst>
-          <a:lin ang="5400000" scaled="0"/>
-        </a:gradFill>
-      </a:fillStyleLst>
-      <a:lnStyleLst>
-        <a:ln w="6350" cap="flat" cmpd="sng" algn="ctr">
-          <a:solidFill>
-            <a:schemeClr val="phClr"/>
-          </a:solidFill>
-          <a:prstDash val="solid"/>
-          <a:miter lim="800000"/>
-        </a:ln>
-        <a:ln w="12700" cap="flat" cmpd="sng" algn="ctr">
-          <a:solidFill>
-            <a:schemeClr val="phClr"/>
-          </a:solidFill>
-          <a:prstDash val="solid"/>
-          <a:miter lim="800000"/>
-        </a:ln>
-        <a:ln w="19050" cap="flat" cmpd="sng" algn="ctr">
-          <a:solidFill>
-            <a:schemeClr val="phClr"/>
-          </a:solidFill>
-          <a:prstDash val="solid"/>
-          <a:miter lim="800000"/>
-        </a:ln>
-      </a:lnStyleLst>
-      <a:effectStyleLst>
-        <a:effectStyle>
-          <a:effectLst/>
-        </a:effectStyle>
-        <a:effectStyle>
-          <a:effectLst/>
-        </a:effectStyle>
-        <a:effectStyle>
-          <a:effectLst>
-            <a:outerShdw blurRad="57150" dist="19050" dir="5400000" algn="ctr" rotWithShape="0">
-              <a:srgbClr val="000000">
-                <a:alpha val="63000"/>
-              </a:srgbClr>
-            </a:outerShdw>
-          </a:effectLst>
-        </a:effectStyle>
-      </a:effectStyleLst>
-      <a:bgFillStyleLst>
-        <a:solidFill>
-          <a:schemeClr val="phClr"/>
-        </a:solidFill>
-        <a:solidFill>
-          <a:schemeClr val="phClr">
-            <a:tint val="95000"/>
-            <a:satMod val="170000"/>
-          </a:schemeClr>
-        </a:solidFill>
-        <a:gradFill rotWithShape="1">
-          <a:gsLst>
-            <a:gs pos="0">
-              <a:schemeClr val="phClr">
-                <a:tint val="93000"/>
-                <a:satMod val="150000"/>
-                <a:shade val="98000"/>
-                <a:lumMod val="102000"/>
-              </a:schemeClr>
-            </a:gs>
-            <a:gs pos="50000">
-              <a:schemeClr val="phClr">
-                <a:tint val="98000"/>
-                <a:satMod val="130000"/>
-                <a:shade val="90000"/>
-                <a:lumMod val="103000"/>
-              </a:schemeClr>
-            </a:gs>
-            <a:gs pos="100000">
-              <a:schemeClr val="phClr">
-                <a:shade val="63000"/>
+                <a:shade val="45000"/>
                 <a:satMod val="120000"/>
               </a:schemeClr>
             </a:gs>
           </a:gsLst>
-          <a:lin ang="5400000" scaled="0"/>
+          <a:path path="circle">
+            <a:fillToRect r="100000" b="100000"/>
+          </a:path>
         </a:gradFill>
+        <a:blipFill>
+          <a:blip xmlns:r="http://schemas.openxmlformats.org/officeDocument/2006/relationships" r:embed="rId1">
+            <a:duotone>
+              <a:schemeClr val="phClr">
+                <a:shade val="3000"/>
+                <a:satMod val="110000"/>
+              </a:schemeClr>
+              <a:schemeClr val="phClr">
+                <a:tint val="60000"/>
+                <a:satMod val="425000"/>
+              </a:schemeClr>
+            </a:duotone>
+          </a:blip>
+          <a:stretch>
+            <a:fillRect/>
+          </a:stretch>
+        </a:blipFill>
       </a:bgFillStyleLst>
     </a:fmtScheme>
   </a:themeElements>
   <a:objectDefaults/>
   <a:extraClrSchemeLst/>
-  <a:extLst>
-    <a:ext uri="{05A4C25C-085E-4340-85A3-A5531E510DB2}">
-      <thm15:themeFamily xmlns:thm15="http://schemas.microsoft.com/office/thememl/2012/main" name="Office Theme" id="{62F939B6-93AF-4DB8-9C6B-D6C7DFDC589F}" vid="{4A3C46E8-61CC-4603-A589-7422A47A8E4A}"/>
-    </a:ext>
-  </a:extLst>
 </a:theme>
 </file>
</xml_diff>

<commit_message>
Presentation and Kathy's logtest
The aformentioned artifacts are up.

Signed-off-by: Brian Powell <powellb1@my.erau.edu>
</commit_message>
<xml_diff>
--- a/Artifacts/Cycle 2/Presentation.pptx
+++ b/Artifacts/Cycle 2/Presentation.pptx
@@ -3228,6 +3228,33 @@
             </a:r>
           </a:p>
           <a:p>
+            <a:pPr lvl="1"/>
+            <a:r>
+              <a:rPr lang="en-US" dirty="0" smtClean="0"/>
+              <a:t>Case and point: Our finding paths has a </a:t>
+            </a:r>
+            <a:r>
+              <a:rPr lang="en-US" dirty="0" err="1" smtClean="0"/>
+              <a:t>cyclomatic</a:t>
+            </a:r>
+            <a:r>
+              <a:rPr lang="en-US" dirty="0" smtClean="0"/>
+              <a:t> complexity of 50</a:t>
+            </a:r>
+          </a:p>
+          <a:p>
+            <a:pPr lvl="1"/>
+            <a:r>
+              <a:rPr lang="en-US" dirty="0" smtClean="0"/>
+              <a:t>One of our methods in the GUI has </a:t>
+            </a:r>
+            <a:r>
+              <a:rPr lang="en-US" smtClean="0"/>
+              <a:t>a correlation of 1780%</a:t>
+            </a:r>
+            <a:endParaRPr lang="en-US" dirty="0" smtClean="0"/>
+          </a:p>
+          <a:p>
             <a:r>
               <a:rPr lang="en-US" dirty="0" smtClean="0"/>
               <a:t>Tools that are available to use</a:t>

</xml_diff>